<commit_message>
Added resources to the deck
</commit_message>
<xml_diff>
--- a/Learning to Test Drive_ A Crash Course in Test Driven Development.pptx
+++ b/Learning to Test Drive_ A Crash Course in Test Driven Development.pptx
@@ -5,25 +5,28 @@
     <p:sldMasterId id="2147483654" r:id="rId1"/>
   </p:sldMasterIdLst>
   <p:notesMasterIdLst>
-    <p:notesMasterId r:id="rId18"/>
+    <p:notesMasterId r:id="rId21"/>
   </p:notesMasterIdLst>
   <p:sldIdLst>
     <p:sldId id="256" r:id="rId2"/>
     <p:sldId id="257" r:id="rId3"/>
-    <p:sldId id="258" r:id="rId4"/>
-    <p:sldId id="259" r:id="rId5"/>
-    <p:sldId id="260" r:id="rId6"/>
-    <p:sldId id="261" r:id="rId7"/>
-    <p:sldId id="262" r:id="rId8"/>
-    <p:sldId id="263" r:id="rId9"/>
-    <p:sldId id="264" r:id="rId10"/>
-    <p:sldId id="265" r:id="rId11"/>
-    <p:sldId id="266" r:id="rId12"/>
-    <p:sldId id="267" r:id="rId13"/>
-    <p:sldId id="268" r:id="rId14"/>
-    <p:sldId id="269" r:id="rId15"/>
-    <p:sldId id="270" r:id="rId16"/>
-    <p:sldId id="271" r:id="rId17"/>
+    <p:sldId id="273" r:id="rId4"/>
+    <p:sldId id="258" r:id="rId5"/>
+    <p:sldId id="259" r:id="rId6"/>
+    <p:sldId id="260" r:id="rId7"/>
+    <p:sldId id="261" r:id="rId8"/>
+    <p:sldId id="262" r:id="rId9"/>
+    <p:sldId id="263" r:id="rId10"/>
+    <p:sldId id="264" r:id="rId11"/>
+    <p:sldId id="265" r:id="rId12"/>
+    <p:sldId id="266" r:id="rId13"/>
+    <p:sldId id="267" r:id="rId14"/>
+    <p:sldId id="268" r:id="rId15"/>
+    <p:sldId id="269" r:id="rId16"/>
+    <p:sldId id="270" r:id="rId17"/>
+    <p:sldId id="272" r:id="rId18"/>
+    <p:sldId id="271" r:id="rId19"/>
+    <p:sldId id="274" r:id="rId20"/>
   </p:sldIdLst>
   <p:sldSz cx="9144000" cy="6858000" type="screen4x3"/>
   <p:notesSz cx="6858000" cy="9144000"/>
@@ -491,8 +494,8 @@
         </p:nvSpPr>
         <p:spPr>
           <a:xfrm>
-            <a:off x="1143225" y="685800"/>
-            <a:ext cx="4572299" cy="3429000"/>
+            <a:off x="1143000" y="685800"/>
+            <a:ext cx="4572000" cy="3429000"/>
           </a:xfrm>
           <a:custGeom>
             <a:avLst/>
@@ -545,7 +548,7 @@
           </a:bodyPr>
           <a:lstStyle/>
           <a:p>
-            <a:endParaRPr/>
+            <a:endParaRPr dirty="0"/>
           </a:p>
         </p:txBody>
       </p:sp>
@@ -558,6 +561,578 @@
 </file>
 
 <file path=ppt/notesSlides/notesSlide10.xml><?xml version="1.0" encoding="utf-8"?>
+<p:notes xmlns:a="http://schemas.openxmlformats.org/drawingml/2006/main" xmlns:r="http://schemas.openxmlformats.org/officeDocument/2006/relationships" xmlns:p="http://schemas.openxmlformats.org/presentationml/2006/main" showMasterSp="0" showMasterPhAnim="0">
+  <p:cSld>
+    <p:spTree>
+      <p:nvGrpSpPr>
+        <p:cNvPr id="1" name="Shape 147"/>
+        <p:cNvGrpSpPr/>
+        <p:nvPr/>
+      </p:nvGrpSpPr>
+      <p:grpSpPr>
+        <a:xfrm>
+          <a:off x="0" y="0"/>
+          <a:ext cx="0" cy="0"/>
+          <a:chOff x="0" y="0"/>
+          <a:chExt cx="0" cy="0"/>
+        </a:xfrm>
+      </p:grpSpPr>
+      <p:sp>
+        <p:nvSpPr>
+          <p:cNvPr id="148" name="Shape 148"/>
+          <p:cNvSpPr>
+            <a:spLocks noGrp="1" noRot="1" noChangeAspect="1"/>
+          </p:cNvSpPr>
+          <p:nvPr>
+            <p:ph type="sldImg" idx="2"/>
+          </p:nvPr>
+        </p:nvSpPr>
+        <p:spPr>
+          <a:xfrm>
+            <a:off x="1143225" y="685800"/>
+            <a:ext cx="4572299" cy="3429000"/>
+          </a:xfrm>
+          <a:custGeom>
+            <a:avLst/>
+            <a:gdLst/>
+            <a:ahLst/>
+            <a:cxnLst/>
+            <a:rect l="0" t="0" r="0" b="0"/>
+            <a:pathLst>
+              <a:path w="120000" h="120000" extrusionOk="0">
+                <a:moveTo>
+                  <a:pt x="0" y="0"/>
+                </a:moveTo>
+                <a:lnTo>
+                  <a:pt x="120000" y="0"/>
+                </a:lnTo>
+                <a:lnTo>
+                  <a:pt x="120000" y="120000"/>
+                </a:lnTo>
+                <a:lnTo>
+                  <a:pt x="0" y="120000"/>
+                </a:lnTo>
+                <a:close/>
+              </a:path>
+            </a:pathLst>
+          </a:custGeom>
+        </p:spPr>
+      </p:sp>
+      <p:sp>
+        <p:nvSpPr>
+          <p:cNvPr id="149" name="Shape 149"/>
+          <p:cNvSpPr txBox="1">
+            <a:spLocks noGrp="1"/>
+          </p:cNvSpPr>
+          <p:nvPr>
+            <p:ph type="body" idx="1"/>
+          </p:nvPr>
+        </p:nvSpPr>
+        <p:spPr>
+          <a:xfrm>
+            <a:off x="685800" y="4343400"/>
+            <a:ext cx="5486399" cy="4114800"/>
+          </a:xfrm>
+          <a:prstGeom prst="rect">
+            <a:avLst/>
+          </a:prstGeom>
+        </p:spPr>
+        <p:txBody>
+          <a:bodyPr lIns="91425" tIns="91425" rIns="91425" bIns="91425" anchor="t" anchorCtr="0">
+            <a:noAutofit/>
+          </a:bodyPr>
+          <a:lstStyle/>
+          <a:p>
+            <a:pPr lvl="0" rtl="0">
+              <a:lnSpc>
+                <a:spcPct val="115000"/>
+              </a:lnSpc>
+              <a:buClr>
+                <a:schemeClr val="dk1"/>
+              </a:buClr>
+              <a:buSzPct val="110000"/>
+              <a:buFont typeface="Arial"/>
+              <a:buNone/>
+            </a:pPr>
+            <a:r>
+              <a:rPr lang="en" sz="1000">
+                <a:solidFill>
+                  <a:schemeClr val="dk1"/>
+                </a:solidFill>
+              </a:rPr>
+              <a:t>Introduce Test-Driven Development and contrast it with the traditional test-last approach. Discuss the </a:t>
+            </a:r>
+          </a:p>
+          <a:p>
+            <a:pPr lvl="0" rtl="0">
+              <a:lnSpc>
+                <a:spcPct val="115000"/>
+              </a:lnSpc>
+              <a:buNone/>
+            </a:pPr>
+            <a:r>
+              <a:rPr lang="en" sz="1000">
+                <a:solidFill>
+                  <a:schemeClr val="dk1"/>
+                </a:solidFill>
+              </a:rPr>
+              <a:t>benefits and process of TDD and how it can lead to better overall design and simplicity. Topics include:</a:t>
+            </a:r>
+          </a:p>
+          <a:p>
+            <a:endParaRPr lang="en" sz="1000">
+              <a:solidFill>
+                <a:schemeClr val="dk1"/>
+              </a:solidFill>
+            </a:endParaRPr>
+          </a:p>
+          <a:p>
+            <a:pPr lvl="0" rtl="0">
+              <a:lnSpc>
+                <a:spcPct val="115000"/>
+              </a:lnSpc>
+              <a:buClr>
+                <a:schemeClr val="dk1"/>
+              </a:buClr>
+              <a:buSzPct val="110000"/>
+              <a:buFont typeface="Arial"/>
+              <a:buNone/>
+            </a:pPr>
+            <a:r>
+              <a:rPr lang="en" sz="1000">
+                <a:solidFill>
+                  <a:schemeClr val="dk1"/>
+                </a:solidFill>
+              </a:rPr>
+              <a:t>Test First (Test Driven) vs. Test After - 5 minutes</a:t>
+            </a:r>
+          </a:p>
+          <a:p>
+            <a:pPr marL="457200" lvl="0" indent="0" rtl="0">
+              <a:lnSpc>
+                <a:spcPct val="115000"/>
+              </a:lnSpc>
+              <a:buClr>
+                <a:schemeClr val="dk1"/>
+              </a:buClr>
+              <a:buSzPct val="110000"/>
+              <a:buFont typeface="Arial"/>
+              <a:buNone/>
+            </a:pPr>
+            <a:r>
+              <a:rPr lang="en" sz="1000">
+                <a:solidFill>
+                  <a:schemeClr val="dk1"/>
+                </a:solidFill>
+              </a:rPr>
+              <a:t>• What’s the difference? See: Thesis Conclusions</a:t>
+            </a:r>
+          </a:p>
+          <a:p>
+            <a:endParaRPr lang="en" sz="1000">
+              <a:solidFill>
+                <a:schemeClr val="dk1"/>
+              </a:solidFill>
+            </a:endParaRPr>
+          </a:p>
+          <a:p>
+            <a:pPr marL="457200" lvl="0" indent="0" rtl="0">
+              <a:lnSpc>
+                <a:spcPct val="115000"/>
+              </a:lnSpc>
+              <a:buClr>
+                <a:schemeClr val="dk1"/>
+              </a:buClr>
+              <a:buSzPct val="110000"/>
+              <a:buFont typeface="Arial"/>
+              <a:buNone/>
+            </a:pPr>
+            <a:r>
+              <a:rPr lang="en" sz="1000">
+                <a:solidFill>
+                  <a:schemeClr val="dk1"/>
+                </a:solidFill>
+              </a:rPr>
+              <a:t>To make a long story short:				</a:t>
+            </a:r>
+          </a:p>
+          <a:p>
+            <a:pPr marL="914400" lvl="0" indent="-292100" rtl="0">
+              <a:lnSpc>
+                <a:spcPct val="115000"/>
+              </a:lnSpc>
+              <a:buClr>
+                <a:schemeClr val="dk1"/>
+              </a:buClr>
+              <a:buSzPct val="100000"/>
+              <a:buFont typeface="Arial"/>
+              <a:buAutoNum type="arabicPeriod"/>
+            </a:pPr>
+            <a:r>
+              <a:rPr lang="en" sz="1000">
+                <a:solidFill>
+                  <a:schemeClr val="dk1"/>
+                </a:solidFill>
+              </a:rPr>
+              <a:t>Test-Driven Development offered an overall improvement of 21% over code written using the test-last technique. 				</a:t>
+            </a:r>
+          </a:p>
+          <a:p>
+            <a:pPr marL="914400" lvl="0" indent="-292100" rtl="0">
+              <a:lnSpc>
+                <a:spcPct val="115000"/>
+              </a:lnSpc>
+              <a:buClr>
+                <a:schemeClr val="dk1"/>
+              </a:buClr>
+              <a:buSzPct val="100000"/>
+              <a:buFont typeface="Arial"/>
+              <a:buAutoNum type="arabicPeriod"/>
+            </a:pPr>
+            <a:r>
+              <a:rPr lang="en" sz="1000">
+                <a:solidFill>
+                  <a:schemeClr val="dk1"/>
+                </a:solidFill>
+              </a:rPr>
+              <a:t>Test-Driven Development was most effective at decreasing the complexity of the code, with an improvement of 31%. </a:t>
+            </a:r>
+          </a:p>
+          <a:p>
+            <a:pPr marL="914400" lvl="0" indent="-292100" rtl="0">
+              <a:lnSpc>
+                <a:spcPct val="115000"/>
+              </a:lnSpc>
+              <a:buClr>
+                <a:schemeClr val="dk1"/>
+              </a:buClr>
+              <a:buSzPct val="100000"/>
+              <a:buFont typeface="Arial"/>
+              <a:buAutoNum type="arabicPeriod"/>
+            </a:pPr>
+            <a:r>
+              <a:rPr lang="en" sz="1000">
+                <a:solidFill>
+                  <a:schemeClr val="dk1"/>
+                </a:solidFill>
+              </a:rPr>
+              <a:t>The next-best improvement was on cohesion metrics, an improvement of 21%. </a:t>
+            </a:r>
+          </a:p>
+          <a:p>
+            <a:pPr marL="914400" lvl="0" indent="-292100" rtl="0">
+              <a:lnSpc>
+                <a:spcPct val="115000"/>
+              </a:lnSpc>
+              <a:buClr>
+                <a:schemeClr val="dk1"/>
+              </a:buClr>
+              <a:buSzPct val="100000"/>
+              <a:buFont typeface="Arial"/>
+              <a:buAutoNum type="arabicPeriod"/>
+            </a:pPr>
+            <a:r>
+              <a:rPr lang="en" sz="1000">
+                <a:solidFill>
+                  <a:schemeClr val="dk1"/>
+                </a:solidFill>
+              </a:rPr>
+              <a:t>The smallest improvement Test-Driven Development offered was on coupling metrics, only 10%. Miller (2008) explains that tight coupling means that modules and subsystems must know the details of other modules and subsystems in order to function. This means that, for tightly coupled systems, in order to write tests that verify whether a module or subsystem functions correctly, the test must also involve the details of other modules and subsystems. Essentially, tests become harder and harder to write the more tightly coupled the different parts of the system are. As explained by Tate and Gehtland (2004), the best defense against high system coupling is writing tests. </a:t>
+            </a:r>
+          </a:p>
+          <a:p>
+            <a:endParaRPr lang="en" sz="1000">
+              <a:solidFill>
+                <a:schemeClr val="dk1"/>
+              </a:solidFill>
+            </a:endParaRPr>
+          </a:p>
+          <a:p>
+            <a:pPr marL="457200" lvl="0" indent="0" rtl="0">
+              <a:lnSpc>
+                <a:spcPct val="115000"/>
+              </a:lnSpc>
+              <a:buClr>
+                <a:schemeClr val="dk1"/>
+              </a:buClr>
+              <a:buSzPct val="110000"/>
+              <a:buFont typeface="Arial"/>
+              <a:buNone/>
+            </a:pPr>
+            <a:r>
+              <a:rPr lang="en" sz="1000">
+                <a:solidFill>
+                  <a:schemeClr val="dk1"/>
+                </a:solidFill>
+              </a:rPr>
+              <a:t>• If I test after I still have the “safety net” right? Let’s talk about test coverage.</a:t>
+            </a:r>
+          </a:p>
+          <a:p>
+            <a:endParaRPr lang="en" sz="1000">
+              <a:solidFill>
+                <a:schemeClr val="dk1"/>
+              </a:solidFill>
+            </a:endParaRPr>
+          </a:p>
+          <a:p>
+            <a:pPr marL="457200" lvl="0" indent="0" rtl="0">
+              <a:lnSpc>
+                <a:spcPct val="115000"/>
+              </a:lnSpc>
+              <a:buClr>
+                <a:schemeClr val="dk1"/>
+              </a:buClr>
+              <a:buSzPct val="110000"/>
+              <a:buFont typeface="Arial"/>
+              <a:buNone/>
+            </a:pPr>
+            <a:r>
+              <a:rPr lang="en" sz="1000">
+                <a:solidFill>
+                  <a:schemeClr val="dk1"/>
+                </a:solidFill>
+              </a:rPr>
+              <a:t>Gaps in coverage mean gaps in the net. </a:t>
+            </a:r>
+          </a:p>
+          <a:p>
+            <a:endParaRPr lang="en" sz="1000">
+              <a:solidFill>
+                <a:schemeClr val="dk1"/>
+              </a:solidFill>
+            </a:endParaRPr>
+          </a:p>
+          <a:p>
+            <a:pPr marL="457200" lvl="0" indent="0" rtl="0">
+              <a:lnSpc>
+                <a:spcPct val="115000"/>
+              </a:lnSpc>
+              <a:buClr>
+                <a:schemeClr val="dk1"/>
+              </a:buClr>
+              <a:buSzPct val="110000"/>
+              <a:buFont typeface="Arial"/>
+              <a:buNone/>
+            </a:pPr>
+            <a:r>
+              <a:rPr lang="en" sz="1000">
+                <a:solidFill>
+                  <a:schemeClr val="dk1"/>
+                </a:solidFill>
+              </a:rPr>
+              <a:t>• Do you think your design and implementation will be the same?</a:t>
+            </a:r>
+          </a:p>
+          <a:p>
+            <a:endParaRPr lang="en" sz="1000">
+              <a:solidFill>
+                <a:schemeClr val="dk1"/>
+              </a:solidFill>
+            </a:endParaRPr>
+          </a:p>
+          <a:p>
+            <a:pPr marL="457200" lvl="0" indent="0" rtl="0">
+              <a:lnSpc>
+                <a:spcPct val="115000"/>
+              </a:lnSpc>
+              <a:buClr>
+                <a:schemeClr val="dk1"/>
+              </a:buClr>
+              <a:buSzPct val="110000"/>
+              <a:buFont typeface="Arial"/>
+              <a:buNone/>
+            </a:pPr>
+            <a:r>
+              <a:rPr lang="en" sz="1000">
+                <a:solidFill>
+                  <a:schemeClr val="dk1"/>
+                </a:solidFill>
+              </a:rPr>
+              <a:t>Why do you think complexity was decreased by 31%?</a:t>
+            </a:r>
+          </a:p>
+          <a:p>
+            <a:pPr marL="914400" lvl="0" indent="-292100" rtl="0">
+              <a:lnSpc>
+                <a:spcPct val="115000"/>
+              </a:lnSpc>
+              <a:buClr>
+                <a:schemeClr val="dk1"/>
+              </a:buClr>
+              <a:buSzPct val="100000"/>
+              <a:buFont typeface="Arial"/>
+              <a:buChar char="●"/>
+            </a:pPr>
+            <a:r>
+              <a:rPr lang="en" sz="1000">
+                <a:solidFill>
+                  <a:schemeClr val="dk1"/>
+                </a:solidFill>
+              </a:rPr>
+              <a:t>TDD forces you to think smaller and simpler</a:t>
+            </a:r>
+          </a:p>
+          <a:p>
+            <a:pPr marL="914400" lvl="0" indent="-292100" rtl="0">
+              <a:lnSpc>
+                <a:spcPct val="115000"/>
+              </a:lnSpc>
+              <a:buClr>
+                <a:schemeClr val="dk1"/>
+              </a:buClr>
+              <a:buSzPct val="100000"/>
+              <a:buFont typeface="Arial"/>
+              <a:buChar char="●"/>
+            </a:pPr>
+            <a:r>
+              <a:rPr lang="en" sz="1000">
+                <a:solidFill>
+                  <a:schemeClr val="dk1"/>
+                </a:solidFill>
+              </a:rPr>
+              <a:t>TDD allows you to refactor fearlessly (we will get to that in a minute)</a:t>
+            </a:r>
+          </a:p>
+          <a:p>
+            <a:endParaRPr lang="en" sz="1000">
+              <a:solidFill>
+                <a:schemeClr val="dk1"/>
+              </a:solidFill>
+            </a:endParaRPr>
+          </a:p>
+          <a:p>
+            <a:pPr lvl="0" rtl="0">
+              <a:lnSpc>
+                <a:spcPct val="115000"/>
+              </a:lnSpc>
+              <a:buClr>
+                <a:schemeClr val="dk1"/>
+              </a:buClr>
+              <a:buSzPct val="110000"/>
+              <a:buFont typeface="Arial"/>
+              <a:buNone/>
+            </a:pPr>
+            <a:r>
+              <a:rPr lang="en" sz="1000">
+                <a:solidFill>
+                  <a:schemeClr val="dk1"/>
+                </a:solidFill>
+              </a:rPr>
+              <a:t>	Why improvement in cohesion and coupling?</a:t>
+            </a:r>
+          </a:p>
+          <a:p>
+            <a:pPr marL="914400" lvl="0" indent="-292100" rtl="0">
+              <a:lnSpc>
+                <a:spcPct val="115000"/>
+              </a:lnSpc>
+              <a:buClr>
+                <a:schemeClr val="dk1"/>
+              </a:buClr>
+              <a:buSzPct val="100000"/>
+              <a:buFont typeface="Arial"/>
+              <a:buChar char="●"/>
+            </a:pPr>
+            <a:r>
+              <a:rPr lang="en" sz="1000">
+                <a:solidFill>
+                  <a:schemeClr val="dk1"/>
+                </a:solidFill>
+              </a:rPr>
+              <a:t>Recall that cohesion is essentially a measure of how related all of the responsibilities of a module are.  Instead of writing big classes with many lines of code, TDD encourages developers to write simple and small classes, and use the power of object orientation mechanisms to put all the classes together. </a:t>
+            </a:r>
+          </a:p>
+          <a:p>
+            <a:pPr marL="914400" lvl="0" indent="-292100" rtl="0">
+              <a:lnSpc>
+                <a:spcPct val="115000"/>
+              </a:lnSpc>
+              <a:buClr>
+                <a:schemeClr val="dk1"/>
+              </a:buClr>
+              <a:buSzPct val="100000"/>
+              <a:buFont typeface="Arial"/>
+              <a:buChar char="●"/>
+            </a:pPr>
+            <a:r>
+              <a:rPr lang="en" sz="1000">
+                <a:solidFill>
+                  <a:schemeClr val="dk1"/>
+                </a:solidFill>
+              </a:rPr>
+              <a:t>In regards to the 10% reduction in coupling.  In order to test, TDD encourages developers to follow some good object orientation principles: classes explicit their dependencies, and therefore become opened for extensions; coupling usually tend to be to high-level stable interfaces, reducing the risk of a modiﬁcation caused by changes in any dependency.</a:t>
+            </a:r>
+          </a:p>
+          <a:p>
+            <a:endParaRPr lang="en" sz="1000">
+              <a:solidFill>
+                <a:schemeClr val="dk1"/>
+              </a:solidFill>
+            </a:endParaRPr>
+          </a:p>
+          <a:p>
+            <a:endParaRPr lang="en" sz="1000">
+              <a:solidFill>
+                <a:schemeClr val="dk1"/>
+              </a:solidFill>
+            </a:endParaRPr>
+          </a:p>
+          <a:p>
+            <a:pPr lvl="0" rtl="0">
+              <a:lnSpc>
+                <a:spcPct val="115000"/>
+              </a:lnSpc>
+              <a:buClr>
+                <a:schemeClr val="dk1"/>
+              </a:buClr>
+              <a:buSzPct val="110000"/>
+              <a:buFont typeface="Arial"/>
+              <a:buNone/>
+            </a:pPr>
+            <a:r>
+              <a:rPr lang="en" sz="1000">
+                <a:solidFill>
+                  <a:schemeClr val="dk1"/>
+                </a:solidFill>
+              </a:rPr>
+              <a:t>See: How Test-Driven Development Inﬂuences Class Design: A Practitioner’s Point of View, </a:t>
+            </a:r>
+            <a:r>
+              <a:rPr lang="en" sz="1000" i="1">
+                <a:solidFill>
+                  <a:schemeClr val="dk1"/>
+                </a:solidFill>
+              </a:rPr>
+              <a:t>Mauricio Finavaro Aniche, Marco Aurelio Gerosa.</a:t>
+            </a:r>
+            <a:r>
+              <a:rPr lang="en" sz="1000">
+                <a:solidFill>
+                  <a:schemeClr val="dk1"/>
+                </a:solidFill>
+              </a:rPr>
+              <a:t> http://www.ime.usp.br/~aniche/files/tdd-and-design-draft.pdf</a:t>
+            </a:r>
+          </a:p>
+          <a:p>
+            <a:endParaRPr lang="en" sz="1000">
+              <a:solidFill>
+                <a:schemeClr val="dk1"/>
+              </a:solidFill>
+            </a:endParaRPr>
+          </a:p>
+        </p:txBody>
+      </p:sp>
+    </p:spTree>
+  </p:cSld>
+  <p:clrMapOvr>
+    <a:masterClrMapping/>
+  </p:clrMapOvr>
+</p:notes>
+</file>
+
+<file path=ppt/notesSlides/notesSlide11.xml><?xml version="1.0" encoding="utf-8"?>
 <p:notes xmlns:a="http://schemas.openxmlformats.org/drawingml/2006/main" xmlns:r="http://schemas.openxmlformats.org/officeDocument/2006/relationships" xmlns:p="http://schemas.openxmlformats.org/presentationml/2006/main" showMasterSp="0" showMasterPhAnim="0">
   <p:cSld>
     <p:spTree>
@@ -868,7 +1443,7 @@
 </p:notes>
 </file>
 
-<file path=ppt/notesSlides/notesSlide11.xml><?xml version="1.0" encoding="utf-8"?>
+<file path=ppt/notesSlides/notesSlide12.xml><?xml version="1.0" encoding="utf-8"?>
 <p:notes xmlns:a="http://schemas.openxmlformats.org/drawingml/2006/main" xmlns:r="http://schemas.openxmlformats.org/officeDocument/2006/relationships" xmlns:p="http://schemas.openxmlformats.org/presentationml/2006/main" showMasterSp="0" showMasterPhAnim="0">
   <p:cSld>
     <p:spTree>
@@ -1212,7 +1787,7 @@
 </p:notes>
 </file>
 
-<file path=ppt/notesSlides/notesSlide12.xml><?xml version="1.0" encoding="utf-8"?>
+<file path=ppt/notesSlides/notesSlide13.xml><?xml version="1.0" encoding="utf-8"?>
 <p:notes xmlns:a="http://schemas.openxmlformats.org/drawingml/2006/main" xmlns:r="http://schemas.openxmlformats.org/officeDocument/2006/relationships" xmlns:p="http://schemas.openxmlformats.org/presentationml/2006/main" showMasterSp="0" showMasterPhAnim="0">
   <p:cSld>
     <p:spTree>
@@ -1437,7 +2012,7 @@
 </p:notes>
 </file>
 
-<file path=ppt/notesSlides/notesSlide13.xml><?xml version="1.0" encoding="utf-8"?>
+<file path=ppt/notesSlides/notesSlide14.xml><?xml version="1.0" encoding="utf-8"?>
 <p:notes xmlns:a="http://schemas.openxmlformats.org/drawingml/2006/main" xmlns:r="http://schemas.openxmlformats.org/officeDocument/2006/relationships" xmlns:p="http://schemas.openxmlformats.org/presentationml/2006/main" showMasterSp="0" showMasterPhAnim="0">
   <p:cSld>
     <p:spTree>
@@ -1753,7 +2328,7 @@
 </p:notes>
 </file>
 
-<file path=ppt/notesSlides/notesSlide14.xml><?xml version="1.0" encoding="utf-8"?>
+<file path=ppt/notesSlides/notesSlide15.xml><?xml version="1.0" encoding="utf-8"?>
 <p:notes xmlns:a="http://schemas.openxmlformats.org/drawingml/2006/main" xmlns:r="http://schemas.openxmlformats.org/officeDocument/2006/relationships" xmlns:p="http://schemas.openxmlformats.org/presentationml/2006/main" showMasterSp="0" showMasterPhAnim="0">
   <p:cSld>
     <p:spTree>
@@ -1985,7 +2560,7 @@
 </p:notes>
 </file>
 
-<file path=ppt/notesSlides/notesSlide15.xml><?xml version="1.0" encoding="utf-8"?>
+<file path=ppt/notesSlides/notesSlide16.xml><?xml version="1.0" encoding="utf-8"?>
 <p:notes xmlns:a="http://schemas.openxmlformats.org/drawingml/2006/main" xmlns:r="http://schemas.openxmlformats.org/officeDocument/2006/relationships" xmlns:p="http://schemas.openxmlformats.org/presentationml/2006/main" showMasterSp="0" showMasterPhAnim="0">
   <p:cSld>
     <p:spTree>
@@ -2119,7 +2694,141 @@
 </p:notes>
 </file>
 
-<file path=ppt/notesSlides/notesSlide16.xml><?xml version="1.0" encoding="utf-8"?>
+<file path=ppt/notesSlides/notesSlide17.xml><?xml version="1.0" encoding="utf-8"?>
+<p:notes xmlns:a="http://schemas.openxmlformats.org/drawingml/2006/main" xmlns:r="http://schemas.openxmlformats.org/officeDocument/2006/relationships" xmlns:p="http://schemas.openxmlformats.org/presentationml/2006/main" showMasterSp="0" showMasterPhAnim="0">
+  <p:cSld>
+    <p:spTree>
+      <p:nvGrpSpPr>
+        <p:cNvPr id="1" name="Shape 189"/>
+        <p:cNvGrpSpPr/>
+        <p:nvPr/>
+      </p:nvGrpSpPr>
+      <p:grpSpPr>
+        <a:xfrm>
+          <a:off x="0" y="0"/>
+          <a:ext cx="0" cy="0"/>
+          <a:chOff x="0" y="0"/>
+          <a:chExt cx="0" cy="0"/>
+        </a:xfrm>
+      </p:grpSpPr>
+      <p:sp>
+        <p:nvSpPr>
+          <p:cNvPr id="190" name="Shape 190"/>
+          <p:cNvSpPr>
+            <a:spLocks noGrp="1" noRot="1" noChangeAspect="1"/>
+          </p:cNvSpPr>
+          <p:nvPr>
+            <p:ph type="sldImg" idx="2"/>
+          </p:nvPr>
+        </p:nvSpPr>
+        <p:spPr>
+          <a:xfrm>
+            <a:off x="1143000" y="685800"/>
+            <a:ext cx="4572000" cy="3429000"/>
+          </a:xfrm>
+          <a:custGeom>
+            <a:avLst/>
+            <a:gdLst/>
+            <a:ahLst/>
+            <a:cxnLst/>
+            <a:rect l="0" t="0" r="0" b="0"/>
+            <a:pathLst>
+              <a:path w="120000" h="120000" extrusionOk="0">
+                <a:moveTo>
+                  <a:pt x="0" y="0"/>
+                </a:moveTo>
+                <a:lnTo>
+                  <a:pt x="120000" y="0"/>
+                </a:lnTo>
+                <a:lnTo>
+                  <a:pt x="120000" y="120000"/>
+                </a:lnTo>
+                <a:lnTo>
+                  <a:pt x="0" y="120000"/>
+                </a:lnTo>
+                <a:close/>
+              </a:path>
+            </a:pathLst>
+          </a:custGeom>
+        </p:spPr>
+      </p:sp>
+      <p:sp>
+        <p:nvSpPr>
+          <p:cNvPr id="191" name="Shape 191"/>
+          <p:cNvSpPr txBox="1">
+            <a:spLocks noGrp="1"/>
+          </p:cNvSpPr>
+          <p:nvPr>
+            <p:ph type="body" idx="1"/>
+          </p:nvPr>
+        </p:nvSpPr>
+        <p:spPr>
+          <a:xfrm>
+            <a:off x="685800" y="4343400"/>
+            <a:ext cx="5486399" cy="4114800"/>
+          </a:xfrm>
+          <a:prstGeom prst="rect">
+            <a:avLst/>
+          </a:prstGeom>
+        </p:spPr>
+        <p:txBody>
+          <a:bodyPr lIns="91425" tIns="91425" rIns="91425" bIns="91425" anchor="t" anchorCtr="0">
+            <a:noAutofit/>
+          </a:bodyPr>
+          <a:lstStyle/>
+          <a:p>
+            <a:pPr marL="914400" lvl="0" indent="457200" rtl="0">
+              <a:lnSpc>
+                <a:spcPct val="115000"/>
+              </a:lnSpc>
+              <a:buClr>
+                <a:schemeClr val="dk1"/>
+              </a:buClr>
+              <a:buSzPct val="110000"/>
+              <a:buFont typeface="Arial"/>
+              <a:buNone/>
+            </a:pPr>
+            <a:r>
+              <a:rPr lang="en" sz="1000">
+                <a:solidFill>
+                  <a:schemeClr val="dk1"/>
+                </a:solidFill>
+              </a:rPr>
+              <a:t>Let’s work through the Calculator Kata</a:t>
+            </a:r>
+          </a:p>
+          <a:p>
+            <a:endParaRPr lang="en" sz="1000">
+              <a:solidFill>
+                <a:schemeClr val="dk1"/>
+              </a:solidFill>
+            </a:endParaRPr>
+          </a:p>
+          <a:p>
+            <a:endParaRPr lang="en" sz="1000">
+              <a:solidFill>
+                <a:schemeClr val="dk1"/>
+              </a:solidFill>
+            </a:endParaRPr>
+          </a:p>
+          <a:p>
+            <a:endParaRPr lang="en" sz="1000">
+              <a:solidFill>
+                <a:schemeClr val="dk1"/>
+              </a:solidFill>
+            </a:endParaRPr>
+          </a:p>
+        </p:txBody>
+      </p:sp>
+    </p:spTree>
+  </p:cSld>
+  <p:clrMapOvr>
+    <a:masterClrMapping/>
+  </p:clrMapOvr>
+</p:notes>
+</file>
+
+<file path=ppt/notesSlides/notesSlide18.xml><?xml version="1.0" encoding="utf-8"?>
 <p:notes xmlns:a="http://schemas.openxmlformats.org/drawingml/2006/main" xmlns:r="http://schemas.openxmlformats.org/officeDocument/2006/relationships" xmlns:p="http://schemas.openxmlformats.org/presentationml/2006/main" showMasterSp="0" showMasterPhAnim="0">
   <p:cSld>
     <p:spTree>
@@ -2214,7 +2923,7 @@
               <a:buNone/>
             </a:pPr>
             <a:r>
-              <a:rPr lang="en" sz="1000">
+              <a:rPr lang="en" sz="1000" dirty="0">
                 <a:solidFill>
                   <a:schemeClr val="dk1"/>
                 </a:solidFill>
@@ -2223,21 +2932,965 @@
             </a:r>
           </a:p>
           <a:p>
-            <a:endParaRPr lang="en" sz="1000">
-              <a:solidFill>
-                <a:schemeClr val="dk1"/>
-              </a:solidFill>
-            </a:endParaRPr>
-          </a:p>
-          <a:p>
-            <a:endParaRPr lang="en" sz="1000">
-              <a:solidFill>
-                <a:schemeClr val="dk1"/>
-              </a:solidFill>
-            </a:endParaRPr>
-          </a:p>
-          <a:p>
-            <a:endParaRPr lang="en" sz="1000">
+            <a:endParaRPr lang="en" sz="1000" dirty="0">
+              <a:solidFill>
+                <a:schemeClr val="dk1"/>
+              </a:solidFill>
+            </a:endParaRPr>
+          </a:p>
+        </p:txBody>
+      </p:sp>
+    </p:spTree>
+  </p:cSld>
+  <p:clrMapOvr>
+    <a:masterClrMapping/>
+  </p:clrMapOvr>
+</p:notes>
+</file>
+
+<file path=ppt/notesSlides/notesSlide19.xml><?xml version="1.0" encoding="utf-8"?>
+<p:notes xmlns:a="http://schemas.openxmlformats.org/drawingml/2006/main" xmlns:r="http://schemas.openxmlformats.org/officeDocument/2006/relationships" xmlns:p="http://schemas.openxmlformats.org/presentationml/2006/main" showMasterSp="0" showMasterPhAnim="0">
+  <p:cSld>
+    <p:spTree>
+      <p:nvGrpSpPr>
+        <p:cNvPr id="1" name="Shape 196"/>
+        <p:cNvGrpSpPr/>
+        <p:nvPr/>
+      </p:nvGrpSpPr>
+      <p:grpSpPr>
+        <a:xfrm>
+          <a:off x="0" y="0"/>
+          <a:ext cx="0" cy="0"/>
+          <a:chOff x="0" y="0"/>
+          <a:chExt cx="0" cy="0"/>
+        </a:xfrm>
+      </p:grpSpPr>
+      <p:sp>
+        <p:nvSpPr>
+          <p:cNvPr id="197" name="Shape 197"/>
+          <p:cNvSpPr>
+            <a:spLocks noGrp="1" noRot="1" noChangeAspect="1"/>
+          </p:cNvSpPr>
+          <p:nvPr>
+            <p:ph type="sldImg" idx="2"/>
+          </p:nvPr>
+        </p:nvSpPr>
+        <p:spPr>
+          <a:xfrm>
+            <a:off x="1143000" y="685800"/>
+            <a:ext cx="4572000" cy="3429000"/>
+          </a:xfrm>
+          <a:custGeom>
+            <a:avLst/>
+            <a:gdLst/>
+            <a:ahLst/>
+            <a:cxnLst/>
+            <a:rect l="0" t="0" r="0" b="0"/>
+            <a:pathLst>
+              <a:path w="120000" h="120000" extrusionOk="0">
+                <a:moveTo>
+                  <a:pt x="0" y="0"/>
+                </a:moveTo>
+                <a:lnTo>
+                  <a:pt x="120000" y="0"/>
+                </a:lnTo>
+                <a:lnTo>
+                  <a:pt x="120000" y="120000"/>
+                </a:lnTo>
+                <a:lnTo>
+                  <a:pt x="0" y="120000"/>
+                </a:lnTo>
+                <a:close/>
+              </a:path>
+            </a:pathLst>
+          </a:custGeom>
+        </p:spPr>
+      </p:sp>
+      <p:sp>
+        <p:nvSpPr>
+          <p:cNvPr id="198" name="Shape 198"/>
+          <p:cNvSpPr txBox="1">
+            <a:spLocks noGrp="1"/>
+          </p:cNvSpPr>
+          <p:nvPr>
+            <p:ph type="body" idx="1"/>
+          </p:nvPr>
+        </p:nvSpPr>
+        <p:spPr>
+          <a:xfrm>
+            <a:off x="685800" y="4343400"/>
+            <a:ext cx="5486399" cy="4114800"/>
+          </a:xfrm>
+          <a:prstGeom prst="rect">
+            <a:avLst/>
+          </a:prstGeom>
+        </p:spPr>
+        <p:txBody>
+          <a:bodyPr lIns="91425" tIns="91425" rIns="91425" bIns="91425" anchor="t" anchorCtr="0">
+            <a:noAutofit/>
+          </a:bodyPr>
+          <a:lstStyle/>
+          <a:p>
+            <a:pPr marL="914400" lvl="0" indent="457200" rtl="0">
+              <a:lnSpc>
+                <a:spcPct val="115000"/>
+              </a:lnSpc>
+              <a:buClr>
+                <a:schemeClr val="dk1"/>
+              </a:buClr>
+              <a:buSzPct val="110000"/>
+              <a:buFont typeface="Arial"/>
+              <a:buNone/>
+            </a:pPr>
+            <a:r>
+              <a:rPr lang="en" sz="1000" dirty="0">
+                <a:solidFill>
+                  <a:schemeClr val="dk1"/>
+                </a:solidFill>
+              </a:rPr>
+              <a:t>Let’s work through the Calculator Kata</a:t>
+            </a:r>
+          </a:p>
+          <a:p>
+            <a:endParaRPr lang="en" sz="1000" dirty="0">
+              <a:solidFill>
+                <a:schemeClr val="dk1"/>
+              </a:solidFill>
+            </a:endParaRPr>
+          </a:p>
+          <a:p>
+            <a:endParaRPr lang="en" sz="1000" dirty="0">
+              <a:solidFill>
+                <a:schemeClr val="dk1"/>
+              </a:solidFill>
+            </a:endParaRPr>
+          </a:p>
+          <a:p>
+            <a:r>
+              <a:rPr lang="en" sz="1000" dirty="0" smtClean="0">
+                <a:solidFill>
+                  <a:schemeClr val="dk1"/>
+                </a:solidFill>
+              </a:rPr>
+              <a:t>Resources</a:t>
+            </a:r>
+          </a:p>
+          <a:p>
+            <a:endParaRPr lang="en" sz="1000" dirty="0" smtClean="0">
+              <a:solidFill>
+                <a:schemeClr val="dk1"/>
+              </a:solidFill>
+            </a:endParaRPr>
+          </a:p>
+          <a:p>
+            <a:r>
+              <a:rPr lang="en" sz="1000" dirty="0" smtClean="0">
+                <a:solidFill>
+                  <a:schemeClr val="dk1"/>
+                </a:solidFill>
+              </a:rPr>
+              <a:t>Below is a list of resources used to prepare the materials for this course.</a:t>
+            </a:r>
+          </a:p>
+          <a:p>
+            <a:endParaRPr lang="en" sz="1000" dirty="0" smtClean="0">
+              <a:solidFill>
+                <a:schemeClr val="dk1"/>
+              </a:solidFill>
+            </a:endParaRPr>
+          </a:p>
+          <a:p>
+            <a:r>
+              <a:rPr lang="en" sz="1000" dirty="0" smtClean="0">
+                <a:solidFill>
+                  <a:schemeClr val="dk1"/>
+                </a:solidFill>
+              </a:rPr>
+              <a:t>Links:</a:t>
+            </a:r>
+          </a:p>
+          <a:p>
+            <a:endParaRPr lang="en" sz="1000" dirty="0" smtClean="0">
+              <a:solidFill>
+                <a:schemeClr val="dk1"/>
+              </a:solidFill>
+            </a:endParaRPr>
+          </a:p>
+          <a:p>
+            <a:r>
+              <a:rPr lang="en" sz="1000" dirty="0" smtClean="0">
+                <a:solidFill>
+                  <a:schemeClr val="dk1"/>
+                </a:solidFill>
+              </a:rPr>
+              <a:t>http://a-developer-life.blogspot.com/2011/12/mocks-stubs-expectations-fakes-stubs.html</a:t>
+            </a:r>
+          </a:p>
+          <a:p>
+            <a:endParaRPr lang="en" sz="1000" dirty="0" smtClean="0">
+              <a:solidFill>
+                <a:schemeClr val="dk1"/>
+              </a:solidFill>
+            </a:endParaRPr>
+          </a:p>
+          <a:p>
+            <a:r>
+              <a:rPr lang="en" sz="1000" dirty="0" smtClean="0">
+                <a:solidFill>
+                  <a:schemeClr val="dk1"/>
+                </a:solidFill>
+              </a:rPr>
+              <a:t>http://a-developer-life.blogspot.com/2011/06/jasmine-part-2-spies-and-mocks.html</a:t>
+            </a:r>
+          </a:p>
+          <a:p>
+            <a:endParaRPr lang="en" sz="1000" dirty="0" smtClean="0">
+              <a:solidFill>
+                <a:schemeClr val="dk1"/>
+              </a:solidFill>
+            </a:endParaRPr>
+          </a:p>
+          <a:p>
+            <a:r>
+              <a:rPr lang="en" sz="1000" dirty="0" smtClean="0">
+                <a:solidFill>
+                  <a:schemeClr val="dk1"/>
+                </a:solidFill>
+              </a:rPr>
+              <a:t>https://github.com/tcorral/Refactoring_Patterns</a:t>
+            </a:r>
+          </a:p>
+          <a:p>
+            <a:endParaRPr lang="en" sz="1000" dirty="0" smtClean="0">
+              <a:solidFill>
+                <a:schemeClr val="dk1"/>
+              </a:solidFill>
+            </a:endParaRPr>
+          </a:p>
+          <a:p>
+            <a:r>
+              <a:rPr lang="en" sz="1000" dirty="0" smtClean="0">
+                <a:solidFill>
+                  <a:schemeClr val="dk1"/>
+                </a:solidFill>
+              </a:rPr>
+              <a:t>Jasmine</a:t>
+            </a:r>
+          </a:p>
+          <a:p>
+            <a:endParaRPr lang="en" sz="1000" dirty="0" smtClean="0">
+              <a:solidFill>
+                <a:schemeClr val="dk1"/>
+              </a:solidFill>
+            </a:endParaRPr>
+          </a:p>
+          <a:p>
+            <a:r>
+              <a:rPr lang="en" sz="1000" dirty="0" smtClean="0">
+                <a:solidFill>
+                  <a:schemeClr val="dk1"/>
+                </a:solidFill>
+              </a:rPr>
+              <a:t>http://pivotal.github.io/jasmine/</a:t>
+            </a:r>
+          </a:p>
+          <a:p>
+            <a:endParaRPr lang="en" sz="1000" dirty="0" smtClean="0">
+              <a:solidFill>
+                <a:schemeClr val="dk1"/>
+              </a:solidFill>
+            </a:endParaRPr>
+          </a:p>
+          <a:p>
+            <a:r>
+              <a:rPr lang="en" sz="1000" dirty="0" smtClean="0">
+                <a:solidFill>
+                  <a:schemeClr val="dk1"/>
+                </a:solidFill>
+              </a:rPr>
+              <a:t>https://github.com/velesin/jasmine-jquery</a:t>
+            </a:r>
+          </a:p>
+          <a:p>
+            <a:endParaRPr lang="en" sz="1000" dirty="0" smtClean="0">
+              <a:solidFill>
+                <a:schemeClr val="dk1"/>
+              </a:solidFill>
+            </a:endParaRPr>
+          </a:p>
+          <a:p>
+            <a:r>
+              <a:rPr lang="en" sz="1000" dirty="0" smtClean="0">
+                <a:solidFill>
+                  <a:schemeClr val="dk1"/>
+                </a:solidFill>
+              </a:rPr>
+              <a:t>http://tobyho.com/2011/12/15/jasmine-spy-cheatsheet/</a:t>
+            </a:r>
+          </a:p>
+          <a:p>
+            <a:endParaRPr lang="en" sz="1000" dirty="0" smtClean="0">
+              <a:solidFill>
+                <a:schemeClr val="dk1"/>
+              </a:solidFill>
+            </a:endParaRPr>
+          </a:p>
+          <a:p>
+            <a:r>
+              <a:rPr lang="en" sz="1000" dirty="0" smtClean="0">
+                <a:solidFill>
+                  <a:schemeClr val="dk1"/>
+                </a:solidFill>
+              </a:rPr>
+              <a:t>http://tryjasmine.com/</a:t>
+            </a:r>
+          </a:p>
+          <a:p>
+            <a:endParaRPr lang="en" sz="1000" dirty="0" smtClean="0">
+              <a:solidFill>
+                <a:schemeClr val="dk1"/>
+              </a:solidFill>
+            </a:endParaRPr>
+          </a:p>
+          <a:p>
+            <a:r>
+              <a:rPr lang="en" sz="1000" dirty="0" smtClean="0">
+                <a:solidFill>
+                  <a:schemeClr val="dk1"/>
+                </a:solidFill>
+              </a:rPr>
+              <a:t>Katas:</a:t>
+            </a:r>
+          </a:p>
+          <a:p>
+            <a:endParaRPr lang="en" sz="1000" dirty="0" smtClean="0">
+              <a:solidFill>
+                <a:schemeClr val="dk1"/>
+              </a:solidFill>
+            </a:endParaRPr>
+          </a:p>
+          <a:p>
+            <a:r>
+              <a:rPr lang="en" sz="1000" dirty="0" smtClean="0">
+                <a:solidFill>
+                  <a:schemeClr val="dk1"/>
+                </a:solidFill>
+              </a:rPr>
+              <a:t>http://www.peterprovost.org/blog/2012/05/02/kata-the-only-way-to-learn-tdd</a:t>
+            </a:r>
+          </a:p>
+          <a:p>
+            <a:endParaRPr lang="en" sz="1000" dirty="0" smtClean="0">
+              <a:solidFill>
+                <a:schemeClr val="dk1"/>
+              </a:solidFill>
+            </a:endParaRPr>
+          </a:p>
+          <a:p>
+            <a:r>
+              <a:rPr lang="en" sz="1000" dirty="0" smtClean="0">
+                <a:solidFill>
+                  <a:schemeClr val="dk1"/>
+                </a:solidFill>
+              </a:rPr>
+              <a:t>FizzBuzz</a:t>
+            </a:r>
+          </a:p>
+          <a:p>
+            <a:endParaRPr lang="en" sz="1000" dirty="0" smtClean="0">
+              <a:solidFill>
+                <a:schemeClr val="dk1"/>
+              </a:solidFill>
+            </a:endParaRPr>
+          </a:p>
+          <a:p>
+            <a:r>
+              <a:rPr lang="en" sz="1000" dirty="0" smtClean="0">
+                <a:solidFill>
+                  <a:schemeClr val="dk1"/>
+                </a:solidFill>
+              </a:rPr>
+              <a:t>http://codingdojo.org/cgi-bin/wiki.pl?KataFizzBuzz</a:t>
+            </a:r>
+          </a:p>
+          <a:p>
+            <a:endParaRPr lang="en" sz="1000" dirty="0" smtClean="0">
+              <a:solidFill>
+                <a:schemeClr val="dk1"/>
+              </a:solidFill>
+            </a:endParaRPr>
+          </a:p>
+          <a:p>
+            <a:r>
+              <a:rPr lang="en" sz="1000" dirty="0" smtClean="0">
+                <a:solidFill>
+                  <a:schemeClr val="dk1"/>
+                </a:solidFill>
+              </a:rPr>
+              <a:t>http://www.youtube.com/watch?v=RQTDMk4WCp4&amp;hd=1</a:t>
+            </a:r>
+          </a:p>
+          <a:p>
+            <a:endParaRPr lang="en" sz="1000" dirty="0" smtClean="0">
+              <a:solidFill>
+                <a:schemeClr val="dk1"/>
+              </a:solidFill>
+            </a:endParaRPr>
+          </a:p>
+          <a:p>
+            <a:r>
+              <a:rPr lang="en" sz="1000" dirty="0" smtClean="0">
+                <a:solidFill>
+                  <a:schemeClr val="dk1"/>
+                </a:solidFill>
+              </a:rPr>
+              <a:t>String Calculator</a:t>
+            </a:r>
+          </a:p>
+          <a:p>
+            <a:endParaRPr lang="en" sz="1000" dirty="0" smtClean="0">
+              <a:solidFill>
+                <a:schemeClr val="dk1"/>
+              </a:solidFill>
+            </a:endParaRPr>
+          </a:p>
+          <a:p>
+            <a:r>
+              <a:rPr lang="en" sz="1000" dirty="0" smtClean="0">
+                <a:solidFill>
+                  <a:schemeClr val="dk1"/>
+                </a:solidFill>
+              </a:rPr>
+              <a:t>http://anotherdave.wordpress.com/2010/01/13/calculator-tdd-kata-in-javascript/</a:t>
+            </a:r>
+          </a:p>
+          <a:p>
+            <a:endParaRPr lang="en" sz="1000" dirty="0" smtClean="0">
+              <a:solidFill>
+                <a:schemeClr val="dk1"/>
+              </a:solidFill>
+            </a:endParaRPr>
+          </a:p>
+          <a:p>
+            <a:r>
+              <a:rPr lang="en" sz="1000" dirty="0" smtClean="0">
+                <a:solidFill>
+                  <a:schemeClr val="dk1"/>
+                </a:solidFill>
+              </a:rPr>
+              <a:t>http://vimeo.com/8708519</a:t>
+            </a:r>
+          </a:p>
+          <a:p>
+            <a:endParaRPr lang="en" sz="1000" dirty="0" smtClean="0">
+              <a:solidFill>
+                <a:schemeClr val="dk1"/>
+              </a:solidFill>
+            </a:endParaRPr>
+          </a:p>
+          <a:p>
+            <a:r>
+              <a:rPr lang="en" sz="1000" dirty="0" smtClean="0">
+                <a:solidFill>
+                  <a:schemeClr val="dk1"/>
+                </a:solidFill>
+              </a:rPr>
+              <a:t>Roman Numerals</a:t>
+            </a:r>
+          </a:p>
+          <a:p>
+            <a:endParaRPr lang="en" sz="1000" dirty="0" smtClean="0">
+              <a:solidFill>
+                <a:schemeClr val="dk1"/>
+              </a:solidFill>
+            </a:endParaRPr>
+          </a:p>
+          <a:p>
+            <a:r>
+              <a:rPr lang="en" sz="1000" dirty="0" smtClean="0">
+                <a:solidFill>
+                  <a:schemeClr val="dk1"/>
+                </a:solidFill>
+              </a:rPr>
+              <a:t>http://codingdojo.org/cgi-bin/wiki.pl?KataRomanNumerals</a:t>
+            </a:r>
+          </a:p>
+          <a:p>
+            <a:endParaRPr lang="en" sz="1000" dirty="0" smtClean="0">
+              <a:solidFill>
+                <a:schemeClr val="dk1"/>
+              </a:solidFill>
+            </a:endParaRPr>
+          </a:p>
+          <a:p>
+            <a:r>
+              <a:rPr lang="en" sz="1000" dirty="0" smtClean="0">
+                <a:solidFill>
+                  <a:schemeClr val="dk1"/>
+                </a:solidFill>
+              </a:rPr>
+              <a:t>http://youtu.be/BAavcCsCEpA</a:t>
+            </a:r>
+          </a:p>
+          <a:p>
+            <a:endParaRPr lang="en" sz="1000" dirty="0" smtClean="0">
+              <a:solidFill>
+                <a:schemeClr val="dk1"/>
+              </a:solidFill>
+            </a:endParaRPr>
+          </a:p>
+          <a:p>
+            <a:r>
+              <a:rPr lang="en" sz="1000" dirty="0" smtClean="0">
+                <a:solidFill>
+                  <a:schemeClr val="dk1"/>
+                </a:solidFill>
+              </a:rPr>
+              <a:t>BankOCR</a:t>
+            </a:r>
+          </a:p>
+          <a:p>
+            <a:endParaRPr lang="en" sz="1000" dirty="0" smtClean="0">
+              <a:solidFill>
+                <a:schemeClr val="dk1"/>
+              </a:solidFill>
+            </a:endParaRPr>
+          </a:p>
+          <a:p>
+            <a:r>
+              <a:rPr lang="en" sz="1000" dirty="0" smtClean="0">
+                <a:solidFill>
+                  <a:schemeClr val="dk1"/>
+                </a:solidFill>
+              </a:rPr>
+              <a:t>http://codingdojo.org/cgi-bin/wiki.pl?KataBankOCR</a:t>
+            </a:r>
+          </a:p>
+          <a:p>
+            <a:endParaRPr lang="en" sz="1000" dirty="0" smtClean="0">
+              <a:solidFill>
+                <a:schemeClr val="dk1"/>
+              </a:solidFill>
+            </a:endParaRPr>
+          </a:p>
+          <a:p>
+            <a:r>
+              <a:rPr lang="en" sz="1000" dirty="0" smtClean="0">
+                <a:solidFill>
+                  <a:schemeClr val="dk1"/>
+                </a:solidFill>
+              </a:rPr>
+              <a:t>https://code.google.com/p/danoncodekatas/wiki/KataBankOCRResources</a:t>
+            </a:r>
+          </a:p>
+          <a:p>
+            <a:endParaRPr lang="en" sz="1000" dirty="0" smtClean="0">
+              <a:solidFill>
+                <a:schemeClr val="dk1"/>
+              </a:solidFill>
+            </a:endParaRPr>
+          </a:p>
+          <a:p>
+            <a:r>
+              <a:rPr lang="en" sz="1000" dirty="0" smtClean="0">
+                <a:solidFill>
+                  <a:schemeClr val="dk1"/>
+                </a:solidFill>
+              </a:rPr>
+              <a:t>Below is a list of resources used to prepare the materials for this course.</a:t>
+            </a:r>
+          </a:p>
+          <a:p>
+            <a:endParaRPr lang="en" sz="1000" dirty="0" smtClean="0">
+              <a:solidFill>
+                <a:schemeClr val="dk1"/>
+              </a:solidFill>
+            </a:endParaRPr>
+          </a:p>
+          <a:p>
+            <a:r>
+              <a:rPr lang="en" sz="1000" dirty="0" smtClean="0">
+                <a:solidFill>
+                  <a:schemeClr val="dk1"/>
+                </a:solidFill>
+              </a:rPr>
+              <a:t>Links:</a:t>
+            </a:r>
+          </a:p>
+          <a:p>
+            <a:endParaRPr lang="en" sz="1000" dirty="0" smtClean="0">
+              <a:solidFill>
+                <a:schemeClr val="dk1"/>
+              </a:solidFill>
+            </a:endParaRPr>
+          </a:p>
+          <a:p>
+            <a:r>
+              <a:rPr lang="en" sz="1000" dirty="0" smtClean="0">
+                <a:solidFill>
+                  <a:schemeClr val="dk1"/>
+                </a:solidFill>
+              </a:rPr>
+              <a:t>http://a-developer-life.blogspot.com/2011/12/mocks-stubs-expectations-fakes-stubs.html</a:t>
+            </a:r>
+          </a:p>
+          <a:p>
+            <a:endParaRPr lang="en" sz="1000" dirty="0" smtClean="0">
+              <a:solidFill>
+                <a:schemeClr val="dk1"/>
+              </a:solidFill>
+            </a:endParaRPr>
+          </a:p>
+          <a:p>
+            <a:r>
+              <a:rPr lang="en" sz="1000" dirty="0" smtClean="0">
+                <a:solidFill>
+                  <a:schemeClr val="dk1"/>
+                </a:solidFill>
+              </a:rPr>
+              <a:t>http://a-developer-life.blogspot.com/2011/06/jasmine-part-2-spies-and-mocks.html</a:t>
+            </a:r>
+          </a:p>
+          <a:p>
+            <a:endParaRPr lang="en" sz="1000" dirty="0" smtClean="0">
+              <a:solidFill>
+                <a:schemeClr val="dk1"/>
+              </a:solidFill>
+            </a:endParaRPr>
+          </a:p>
+          <a:p>
+            <a:r>
+              <a:rPr lang="en" sz="1000" dirty="0" smtClean="0">
+                <a:solidFill>
+                  <a:schemeClr val="dk1"/>
+                </a:solidFill>
+              </a:rPr>
+              <a:t>https://github.com/tcorral/Refactoring_Patterns</a:t>
+            </a:r>
+          </a:p>
+          <a:p>
+            <a:endParaRPr lang="en" sz="1000" dirty="0" smtClean="0">
+              <a:solidFill>
+                <a:schemeClr val="dk1"/>
+              </a:solidFill>
+            </a:endParaRPr>
+          </a:p>
+          <a:p>
+            <a:r>
+              <a:rPr lang="en" sz="1000" dirty="0" smtClean="0">
+                <a:solidFill>
+                  <a:schemeClr val="dk1"/>
+                </a:solidFill>
+              </a:rPr>
+              <a:t>Jasmine</a:t>
+            </a:r>
+          </a:p>
+          <a:p>
+            <a:endParaRPr lang="en" sz="1000" dirty="0" smtClean="0">
+              <a:solidFill>
+                <a:schemeClr val="dk1"/>
+              </a:solidFill>
+            </a:endParaRPr>
+          </a:p>
+          <a:p>
+            <a:r>
+              <a:rPr lang="en" sz="1000" dirty="0" smtClean="0">
+                <a:solidFill>
+                  <a:schemeClr val="dk1"/>
+                </a:solidFill>
+              </a:rPr>
+              <a:t>http://pivotal.github.io/jasmine/</a:t>
+            </a:r>
+          </a:p>
+          <a:p>
+            <a:endParaRPr lang="en" sz="1000" dirty="0" smtClean="0">
+              <a:solidFill>
+                <a:schemeClr val="dk1"/>
+              </a:solidFill>
+            </a:endParaRPr>
+          </a:p>
+          <a:p>
+            <a:r>
+              <a:rPr lang="en" sz="1000" dirty="0" smtClean="0">
+                <a:solidFill>
+                  <a:schemeClr val="dk1"/>
+                </a:solidFill>
+              </a:rPr>
+              <a:t>https://github.com/velesin/jasmine-jquery</a:t>
+            </a:r>
+          </a:p>
+          <a:p>
+            <a:endParaRPr lang="en" sz="1000" dirty="0" smtClean="0">
+              <a:solidFill>
+                <a:schemeClr val="dk1"/>
+              </a:solidFill>
+            </a:endParaRPr>
+          </a:p>
+          <a:p>
+            <a:r>
+              <a:rPr lang="en" sz="1000" dirty="0" smtClean="0">
+                <a:solidFill>
+                  <a:schemeClr val="dk1"/>
+                </a:solidFill>
+              </a:rPr>
+              <a:t>http://tobyho.com/2011/12/15/jasmine-spy-cheatsheet/</a:t>
+            </a:r>
+          </a:p>
+          <a:p>
+            <a:endParaRPr lang="en" sz="1000" dirty="0" smtClean="0">
+              <a:solidFill>
+                <a:schemeClr val="dk1"/>
+              </a:solidFill>
+            </a:endParaRPr>
+          </a:p>
+          <a:p>
+            <a:r>
+              <a:rPr lang="en" sz="1000" dirty="0" smtClean="0">
+                <a:solidFill>
+                  <a:schemeClr val="dk1"/>
+                </a:solidFill>
+              </a:rPr>
+              <a:t>http://tryjasmine.com/</a:t>
+            </a:r>
+          </a:p>
+          <a:p>
+            <a:endParaRPr lang="en" sz="1000" dirty="0" smtClean="0">
+              <a:solidFill>
+                <a:schemeClr val="dk1"/>
+              </a:solidFill>
+            </a:endParaRPr>
+          </a:p>
+          <a:p>
+            <a:r>
+              <a:rPr lang="en" sz="1000" dirty="0" smtClean="0">
+                <a:solidFill>
+                  <a:schemeClr val="dk1"/>
+                </a:solidFill>
+              </a:rPr>
+              <a:t>Katas:</a:t>
+            </a:r>
+          </a:p>
+          <a:p>
+            <a:endParaRPr lang="en" sz="1000" dirty="0" smtClean="0">
+              <a:solidFill>
+                <a:schemeClr val="dk1"/>
+              </a:solidFill>
+            </a:endParaRPr>
+          </a:p>
+          <a:p>
+            <a:r>
+              <a:rPr lang="en" sz="1000" dirty="0" smtClean="0">
+                <a:solidFill>
+                  <a:schemeClr val="dk1"/>
+                </a:solidFill>
+              </a:rPr>
+              <a:t>http://www.peterprovost.org/blog/2012/05/02/kata-the-only-way-to-learn-tdd</a:t>
+            </a:r>
+          </a:p>
+          <a:p>
+            <a:endParaRPr lang="en" sz="1000" dirty="0" smtClean="0">
+              <a:solidFill>
+                <a:schemeClr val="dk1"/>
+              </a:solidFill>
+            </a:endParaRPr>
+          </a:p>
+          <a:p>
+            <a:r>
+              <a:rPr lang="en" sz="1000" dirty="0" smtClean="0">
+                <a:solidFill>
+                  <a:schemeClr val="dk1"/>
+                </a:solidFill>
+              </a:rPr>
+              <a:t>FizzBuzz</a:t>
+            </a:r>
+          </a:p>
+          <a:p>
+            <a:endParaRPr lang="en" sz="1000" dirty="0" smtClean="0">
+              <a:solidFill>
+                <a:schemeClr val="dk1"/>
+              </a:solidFill>
+            </a:endParaRPr>
+          </a:p>
+          <a:p>
+            <a:r>
+              <a:rPr lang="en" sz="1000" dirty="0" smtClean="0">
+                <a:solidFill>
+                  <a:schemeClr val="dk1"/>
+                </a:solidFill>
+              </a:rPr>
+              <a:t>http://codingdojo.org/cgi-bin/wiki.pl?KataFizzBuzz</a:t>
+            </a:r>
+          </a:p>
+          <a:p>
+            <a:endParaRPr lang="en" sz="1000" dirty="0" smtClean="0">
+              <a:solidFill>
+                <a:schemeClr val="dk1"/>
+              </a:solidFill>
+            </a:endParaRPr>
+          </a:p>
+          <a:p>
+            <a:r>
+              <a:rPr lang="en" sz="1000" dirty="0" smtClean="0">
+                <a:solidFill>
+                  <a:schemeClr val="dk1"/>
+                </a:solidFill>
+              </a:rPr>
+              <a:t>http://www.youtube.com/watch?v=RQTDMk4WCp4&amp;hd=1</a:t>
+            </a:r>
+          </a:p>
+          <a:p>
+            <a:endParaRPr lang="en" sz="1000" dirty="0" smtClean="0">
+              <a:solidFill>
+                <a:schemeClr val="dk1"/>
+              </a:solidFill>
+            </a:endParaRPr>
+          </a:p>
+          <a:p>
+            <a:r>
+              <a:rPr lang="en" sz="1000" dirty="0" smtClean="0">
+                <a:solidFill>
+                  <a:schemeClr val="dk1"/>
+                </a:solidFill>
+              </a:rPr>
+              <a:t>String Calculator</a:t>
+            </a:r>
+          </a:p>
+          <a:p>
+            <a:endParaRPr lang="en" sz="1000" dirty="0" smtClean="0">
+              <a:solidFill>
+                <a:schemeClr val="dk1"/>
+              </a:solidFill>
+            </a:endParaRPr>
+          </a:p>
+          <a:p>
+            <a:r>
+              <a:rPr lang="en" sz="1000" dirty="0" smtClean="0">
+                <a:solidFill>
+                  <a:schemeClr val="dk1"/>
+                </a:solidFill>
+              </a:rPr>
+              <a:t>http://anotherdave.wordpress.com/2010/01/13/calculator-tdd-kata-in-javascript/</a:t>
+            </a:r>
+          </a:p>
+          <a:p>
+            <a:endParaRPr lang="en" sz="1000" dirty="0" smtClean="0">
+              <a:solidFill>
+                <a:schemeClr val="dk1"/>
+              </a:solidFill>
+            </a:endParaRPr>
+          </a:p>
+          <a:p>
+            <a:r>
+              <a:rPr lang="en" sz="1000" dirty="0" smtClean="0">
+                <a:solidFill>
+                  <a:schemeClr val="dk1"/>
+                </a:solidFill>
+              </a:rPr>
+              <a:t>http://vimeo.com/8708519</a:t>
+            </a:r>
+          </a:p>
+          <a:p>
+            <a:endParaRPr lang="en" sz="1000" dirty="0" smtClean="0">
+              <a:solidFill>
+                <a:schemeClr val="dk1"/>
+              </a:solidFill>
+            </a:endParaRPr>
+          </a:p>
+          <a:p>
+            <a:r>
+              <a:rPr lang="en" sz="1000" dirty="0" smtClean="0">
+                <a:solidFill>
+                  <a:schemeClr val="dk1"/>
+                </a:solidFill>
+              </a:rPr>
+              <a:t>Roman Numerals</a:t>
+            </a:r>
+          </a:p>
+          <a:p>
+            <a:endParaRPr lang="en" sz="1000" dirty="0" smtClean="0">
+              <a:solidFill>
+                <a:schemeClr val="dk1"/>
+              </a:solidFill>
+            </a:endParaRPr>
+          </a:p>
+          <a:p>
+            <a:r>
+              <a:rPr lang="en" sz="1000" dirty="0" smtClean="0">
+                <a:solidFill>
+                  <a:schemeClr val="dk1"/>
+                </a:solidFill>
+              </a:rPr>
+              <a:t>http://codingdojo.org/cgi-bin/wiki.pl?KataRomanNumerals</a:t>
+            </a:r>
+          </a:p>
+          <a:p>
+            <a:endParaRPr lang="en" sz="1000" dirty="0" smtClean="0">
+              <a:solidFill>
+                <a:schemeClr val="dk1"/>
+              </a:solidFill>
+            </a:endParaRPr>
+          </a:p>
+          <a:p>
+            <a:r>
+              <a:rPr lang="en" sz="1000" dirty="0" smtClean="0">
+                <a:solidFill>
+                  <a:schemeClr val="dk1"/>
+                </a:solidFill>
+              </a:rPr>
+              <a:t>http://youtu.be/BAavcCsCEpA</a:t>
+            </a:r>
+          </a:p>
+          <a:p>
+            <a:endParaRPr lang="en" sz="1000" dirty="0" smtClean="0">
+              <a:solidFill>
+                <a:schemeClr val="dk1"/>
+              </a:solidFill>
+            </a:endParaRPr>
+          </a:p>
+          <a:p>
+            <a:r>
+              <a:rPr lang="en" sz="1000" dirty="0" smtClean="0">
+                <a:solidFill>
+                  <a:schemeClr val="dk1"/>
+                </a:solidFill>
+              </a:rPr>
+              <a:t>BankOCR</a:t>
+            </a:r>
+          </a:p>
+          <a:p>
+            <a:endParaRPr lang="en" sz="1000" dirty="0" smtClean="0">
+              <a:solidFill>
+                <a:schemeClr val="dk1"/>
+              </a:solidFill>
+            </a:endParaRPr>
+          </a:p>
+          <a:p>
+            <a:r>
+              <a:rPr lang="en" sz="1000" dirty="0" smtClean="0">
+                <a:solidFill>
+                  <a:schemeClr val="dk1"/>
+                </a:solidFill>
+              </a:rPr>
+              <a:t>http://codingdojo.org/cgi-bin/wiki.pl?KataBankOCR</a:t>
+            </a:r>
+          </a:p>
+          <a:p>
+            <a:endParaRPr lang="en" sz="1000" dirty="0" smtClean="0">
+              <a:solidFill>
+                <a:schemeClr val="dk1"/>
+              </a:solidFill>
+            </a:endParaRPr>
+          </a:p>
+          <a:p>
+            <a:r>
+              <a:rPr lang="en" sz="1000" dirty="0" smtClean="0">
+                <a:solidFill>
+                  <a:schemeClr val="dk1"/>
+                </a:solidFill>
+              </a:rPr>
+              <a:t>https://code.google.com/p/danoncodekatas/wiki/KataBankOCR</a:t>
+            </a:r>
+            <a:endParaRPr lang="en" sz="1000" dirty="0">
               <a:solidFill>
                 <a:schemeClr val="dk1"/>
               </a:solidFill>
@@ -2282,8 +3935,8 @@
         </p:nvSpPr>
         <p:spPr>
           <a:xfrm>
-            <a:off x="1143225" y="685800"/>
-            <a:ext cx="4572299" cy="3429000"/>
+            <a:off x="1143000" y="685800"/>
+            <a:ext cx="4572000" cy="3429000"/>
           </a:xfrm>
           <a:custGeom>
             <a:avLst/>
@@ -2717,6 +4370,469 @@
 </file>
 
 <file path=ppt/notesSlides/notesSlide3.xml><?xml version="1.0" encoding="utf-8"?>
+<p:notes xmlns:a="http://schemas.openxmlformats.org/drawingml/2006/main" xmlns:r="http://schemas.openxmlformats.org/officeDocument/2006/relationships" xmlns:p="http://schemas.openxmlformats.org/presentationml/2006/main" showMasterSp="0" showMasterPhAnim="0">
+  <p:cSld>
+    <p:spTree>
+      <p:nvGrpSpPr>
+        <p:cNvPr id="1" name="Shape 98"/>
+        <p:cNvGrpSpPr/>
+        <p:nvPr/>
+      </p:nvGrpSpPr>
+      <p:grpSpPr>
+        <a:xfrm>
+          <a:off x="0" y="0"/>
+          <a:ext cx="0" cy="0"/>
+          <a:chOff x="0" y="0"/>
+          <a:chExt cx="0" cy="0"/>
+        </a:xfrm>
+      </p:grpSpPr>
+      <p:sp>
+        <p:nvSpPr>
+          <p:cNvPr id="99" name="Shape 99"/>
+          <p:cNvSpPr>
+            <a:spLocks noGrp="1" noRot="1" noChangeAspect="1"/>
+          </p:cNvSpPr>
+          <p:nvPr>
+            <p:ph type="sldImg" idx="2"/>
+          </p:nvPr>
+        </p:nvSpPr>
+        <p:spPr>
+          <a:xfrm>
+            <a:off x="1143000" y="685800"/>
+            <a:ext cx="4572000" cy="3429000"/>
+          </a:xfrm>
+          <a:custGeom>
+            <a:avLst/>
+            <a:gdLst/>
+            <a:ahLst/>
+            <a:cxnLst/>
+            <a:rect l="0" t="0" r="0" b="0"/>
+            <a:pathLst>
+              <a:path w="120000" h="120000" extrusionOk="0">
+                <a:moveTo>
+                  <a:pt x="0" y="0"/>
+                </a:moveTo>
+                <a:lnTo>
+                  <a:pt x="120000" y="0"/>
+                </a:lnTo>
+                <a:lnTo>
+                  <a:pt x="120000" y="120000"/>
+                </a:lnTo>
+                <a:lnTo>
+                  <a:pt x="0" y="120000"/>
+                </a:lnTo>
+                <a:close/>
+              </a:path>
+            </a:pathLst>
+          </a:custGeom>
+        </p:spPr>
+      </p:sp>
+      <p:sp>
+        <p:nvSpPr>
+          <p:cNvPr id="100" name="Shape 100"/>
+          <p:cNvSpPr txBox="1">
+            <a:spLocks noGrp="1"/>
+          </p:cNvSpPr>
+          <p:nvPr>
+            <p:ph type="body" idx="1"/>
+          </p:nvPr>
+        </p:nvSpPr>
+        <p:spPr>
+          <a:xfrm>
+            <a:off x="685800" y="4343400"/>
+            <a:ext cx="5486399" cy="4114800"/>
+          </a:xfrm>
+          <a:prstGeom prst="rect">
+            <a:avLst/>
+          </a:prstGeom>
+        </p:spPr>
+        <p:txBody>
+          <a:bodyPr lIns="91425" tIns="91425" rIns="91425" bIns="91425" anchor="t" anchorCtr="0">
+            <a:noAutofit/>
+          </a:bodyPr>
+          <a:lstStyle/>
+          <a:p>
+            <a:pPr marL="457200" lvl="0" indent="0" rtl="0">
+              <a:lnSpc>
+                <a:spcPct val="115000"/>
+              </a:lnSpc>
+              <a:buClr>
+                <a:schemeClr val="dk1"/>
+              </a:buClr>
+              <a:buSzPct val="110000"/>
+              <a:buFont typeface="Arial"/>
+              <a:buNone/>
+            </a:pPr>
+            <a:r>
+              <a:rPr lang="en" sz="1000">
+                <a:solidFill>
+                  <a:schemeClr val="dk1"/>
+                </a:solidFill>
+              </a:rPr>
+              <a:t>• Why do we test? How do we test our code?</a:t>
+            </a:r>
+          </a:p>
+          <a:p>
+            <a:endParaRPr lang="en" sz="1000">
+              <a:solidFill>
+                <a:schemeClr val="dk1"/>
+              </a:solidFill>
+            </a:endParaRPr>
+          </a:p>
+          <a:p>
+            <a:pPr marL="457200" lvl="0" indent="0" rtl="0">
+              <a:lnSpc>
+                <a:spcPct val="115000"/>
+              </a:lnSpc>
+              <a:buClr>
+                <a:schemeClr val="dk1"/>
+              </a:buClr>
+              <a:buSzPct val="110000"/>
+              <a:buFont typeface="Arial"/>
+              <a:buNone/>
+            </a:pPr>
+            <a:r>
+              <a:rPr lang="en" sz="1000">
+                <a:solidFill>
+                  <a:schemeClr val="dk1"/>
+                </a:solidFill>
+              </a:rPr>
+              <a:t>System.out.println</a:t>
+            </a:r>
+          </a:p>
+          <a:p>
+            <a:pPr marL="457200" lvl="0" indent="0" rtl="0">
+              <a:lnSpc>
+                <a:spcPct val="115000"/>
+              </a:lnSpc>
+              <a:buClr>
+                <a:schemeClr val="dk1"/>
+              </a:buClr>
+              <a:buSzPct val="110000"/>
+              <a:buFont typeface="Arial"/>
+              <a:buNone/>
+            </a:pPr>
+            <a:r>
+              <a:rPr lang="en" sz="1000">
+                <a:solidFill>
+                  <a:schemeClr val="dk1"/>
+                </a:solidFill>
+              </a:rPr>
+              <a:t>Debugging</a:t>
+            </a:r>
+          </a:p>
+          <a:p>
+            <a:pPr marL="457200" lvl="0" indent="0" rtl="0">
+              <a:lnSpc>
+                <a:spcPct val="115000"/>
+              </a:lnSpc>
+              <a:buClr>
+                <a:schemeClr val="dk1"/>
+              </a:buClr>
+              <a:buSzPct val="110000"/>
+              <a:buFont typeface="Arial"/>
+              <a:buNone/>
+            </a:pPr>
+            <a:r>
+              <a:rPr lang="en" sz="1000">
+                <a:solidFill>
+                  <a:schemeClr val="dk1"/>
+                </a:solidFill>
+              </a:rPr>
+              <a:t>main methods</a:t>
+            </a:r>
+          </a:p>
+          <a:p>
+            <a:pPr marL="457200" lvl="0" indent="0" rtl="0">
+              <a:lnSpc>
+                <a:spcPct val="115000"/>
+              </a:lnSpc>
+              <a:buClr>
+                <a:schemeClr val="dk1"/>
+              </a:buClr>
+              <a:buSzPct val="110000"/>
+              <a:buFont typeface="Arial"/>
+              <a:buNone/>
+            </a:pPr>
+            <a:r>
+              <a:rPr lang="en" sz="1000">
+                <a:solidFill>
+                  <a:schemeClr val="dk1"/>
+                </a:solidFill>
+              </a:rPr>
+              <a:t>Refresh your browser (again, and again)</a:t>
+            </a:r>
+          </a:p>
+          <a:p>
+            <a:pPr marL="457200" lvl="0" indent="0" rtl="0">
+              <a:lnSpc>
+                <a:spcPct val="115000"/>
+              </a:lnSpc>
+              <a:buClr>
+                <a:schemeClr val="dk1"/>
+              </a:buClr>
+              <a:buSzPct val="110000"/>
+              <a:buFont typeface="Arial"/>
+              <a:buNone/>
+            </a:pPr>
+            <a:r>
+              <a:rPr lang="en" sz="1000">
+                <a:solidFill>
+                  <a:schemeClr val="dk1"/>
+                </a:solidFill>
+              </a:rPr>
+              <a:t>SQL queries</a:t>
+            </a:r>
+          </a:p>
+          <a:p>
+            <a:pPr marL="457200" lvl="0" indent="0" rtl="0">
+              <a:lnSpc>
+                <a:spcPct val="115000"/>
+              </a:lnSpc>
+              <a:buClr>
+                <a:schemeClr val="dk1"/>
+              </a:buClr>
+              <a:buSzPct val="110000"/>
+              <a:buFont typeface="Arial"/>
+              <a:buNone/>
+            </a:pPr>
+            <a:r>
+              <a:rPr lang="en" sz="1000">
+                <a:solidFill>
+                  <a:schemeClr val="dk1"/>
+                </a:solidFill>
+              </a:rPr>
+              <a:t>Manual inspection of files</a:t>
+            </a:r>
+          </a:p>
+          <a:p>
+            <a:endParaRPr lang="en" sz="1000">
+              <a:solidFill>
+                <a:schemeClr val="dk1"/>
+              </a:solidFill>
+            </a:endParaRPr>
+          </a:p>
+          <a:p>
+            <a:pPr marL="457200" lvl="0" indent="0" rtl="0">
+              <a:lnSpc>
+                <a:spcPct val="115000"/>
+              </a:lnSpc>
+              <a:buClr>
+                <a:schemeClr val="dk1"/>
+              </a:buClr>
+              <a:buSzPct val="110000"/>
+              <a:buFont typeface="Arial"/>
+              <a:buNone/>
+            </a:pPr>
+            <a:r>
+              <a:rPr lang="en" sz="1000">
+                <a:solidFill>
+                  <a:schemeClr val="dk1"/>
+                </a:solidFill>
+              </a:rPr>
+              <a:t>• Is this easy or difficult? Why?</a:t>
+            </a:r>
+          </a:p>
+          <a:p>
+            <a:endParaRPr lang="en" sz="1000">
+              <a:solidFill>
+                <a:schemeClr val="dk1"/>
+              </a:solidFill>
+            </a:endParaRPr>
+          </a:p>
+          <a:p>
+            <a:pPr marL="457200" lvl="0" indent="0" rtl="0">
+              <a:lnSpc>
+                <a:spcPct val="115000"/>
+              </a:lnSpc>
+              <a:buClr>
+                <a:schemeClr val="dk1"/>
+              </a:buClr>
+              <a:buSzPct val="110000"/>
+              <a:buFont typeface="Arial"/>
+              <a:buNone/>
+            </a:pPr>
+            <a:r>
+              <a:rPr lang="en" sz="1000">
+                <a:solidFill>
+                  <a:schemeClr val="dk1"/>
+                </a:solidFill>
+              </a:rPr>
+              <a:t>This is time consuming and and difficult to reproduce.  It’s all manual! </a:t>
+            </a:r>
+          </a:p>
+          <a:p>
+            <a:endParaRPr lang="en" sz="1000">
+              <a:solidFill>
+                <a:schemeClr val="dk1"/>
+              </a:solidFill>
+            </a:endParaRPr>
+          </a:p>
+          <a:p>
+            <a:pPr marL="457200" lvl="0" indent="0" rtl="0">
+              <a:lnSpc>
+                <a:spcPct val="115000"/>
+              </a:lnSpc>
+              <a:buClr>
+                <a:schemeClr val="dk1"/>
+              </a:buClr>
+              <a:buSzPct val="110000"/>
+              <a:buFont typeface="Arial"/>
+              <a:buNone/>
+            </a:pPr>
+            <a:r>
+              <a:rPr lang="en" sz="1000">
+                <a:solidFill>
+                  <a:schemeClr val="dk1"/>
+                </a:solidFill>
+              </a:rPr>
+              <a:t>• What if we didn’t test our code?</a:t>
+            </a:r>
+          </a:p>
+          <a:p>
+            <a:endParaRPr lang="en" sz="1000">
+              <a:solidFill>
+                <a:schemeClr val="dk1"/>
+              </a:solidFill>
+            </a:endParaRPr>
+          </a:p>
+          <a:p>
+            <a:pPr marL="457200" lvl="0" indent="0" rtl="0">
+              <a:lnSpc>
+                <a:spcPct val="115000"/>
+              </a:lnSpc>
+              <a:buClr>
+                <a:schemeClr val="dk1"/>
+              </a:buClr>
+              <a:buSzPct val="110000"/>
+              <a:buFont typeface="Arial"/>
+              <a:buNone/>
+            </a:pPr>
+            <a:r>
+              <a:rPr lang="en" sz="1000">
+                <a:solidFill>
+                  <a:schemeClr val="dk1"/>
+                </a:solidFill>
+              </a:rPr>
+              <a:t>We wouldn’t know it actually worked.  We wouldn’t get paid!</a:t>
+            </a:r>
+          </a:p>
+          <a:p>
+            <a:endParaRPr lang="en" sz="1000">
+              <a:solidFill>
+                <a:schemeClr val="dk1"/>
+              </a:solidFill>
+            </a:endParaRPr>
+          </a:p>
+          <a:p>
+            <a:pPr marL="457200" lvl="0" indent="0" rtl="0">
+              <a:lnSpc>
+                <a:spcPct val="115000"/>
+              </a:lnSpc>
+              <a:buClr>
+                <a:schemeClr val="dk1"/>
+              </a:buClr>
+              <a:buSzPct val="110000"/>
+              <a:buFont typeface="Arial"/>
+              <a:buNone/>
+            </a:pPr>
+            <a:r>
+              <a:rPr lang="en" sz="1000">
+                <a:solidFill>
+                  <a:schemeClr val="dk1"/>
+                </a:solidFill>
+              </a:rPr>
+              <a:t>• What happens when we have to modify existing code?</a:t>
+            </a:r>
+          </a:p>
+          <a:p>
+            <a:endParaRPr lang="en" sz="1000">
+              <a:solidFill>
+                <a:schemeClr val="dk1"/>
+              </a:solidFill>
+            </a:endParaRPr>
+          </a:p>
+          <a:p>
+            <a:pPr marL="457200" lvl="0" indent="0" rtl="0">
+              <a:lnSpc>
+                <a:spcPct val="115000"/>
+              </a:lnSpc>
+              <a:buClr>
+                <a:schemeClr val="dk1"/>
+              </a:buClr>
+              <a:buSzPct val="110000"/>
+              <a:buFont typeface="Arial"/>
+              <a:buNone/>
+            </a:pPr>
+            <a:r>
+              <a:rPr lang="en" sz="1000">
+                <a:solidFill>
+                  <a:schemeClr val="dk1"/>
+                </a:solidFill>
+              </a:rPr>
+              <a:t>You have to re-test everything.</a:t>
+            </a:r>
+          </a:p>
+          <a:p>
+            <a:pPr marL="457200" lvl="0" indent="0" rtl="0">
+              <a:lnSpc>
+                <a:spcPct val="115000"/>
+              </a:lnSpc>
+              <a:buClr>
+                <a:schemeClr val="dk1"/>
+              </a:buClr>
+              <a:buSzPct val="110000"/>
+              <a:buFont typeface="Arial"/>
+              <a:buNone/>
+            </a:pPr>
+            <a:r>
+              <a:rPr lang="en" sz="1000">
+                <a:solidFill>
+                  <a:schemeClr val="dk1"/>
+                </a:solidFill>
+              </a:rPr>
+              <a:t>Talk to the QA guys, ask them for the testing spec, and re-do all the manual testing.</a:t>
+            </a:r>
+          </a:p>
+          <a:p>
+            <a:pPr marL="457200" lvl="0" indent="0" rtl="0">
+              <a:lnSpc>
+                <a:spcPct val="115000"/>
+              </a:lnSpc>
+              <a:buClr>
+                <a:schemeClr val="dk1"/>
+              </a:buClr>
+              <a:buSzPct val="110000"/>
+              <a:buFont typeface="Arial"/>
+              <a:buNone/>
+            </a:pPr>
+            <a:r>
+              <a:rPr lang="en" sz="1000">
+                <a:solidFill>
+                  <a:schemeClr val="dk1"/>
+                </a:solidFill>
+              </a:rPr>
+              <a:t>You have to do this every time you introduce a change into the system (that sucks!)</a:t>
+            </a:r>
+          </a:p>
+          <a:p>
+            <a:endParaRPr lang="en" sz="1000">
+              <a:solidFill>
+                <a:schemeClr val="dk1"/>
+              </a:solidFill>
+            </a:endParaRPr>
+          </a:p>
+        </p:txBody>
+      </p:sp>
+    </p:spTree>
+  </p:cSld>
+  <p:clrMapOvr>
+    <a:masterClrMapping/>
+  </p:clrMapOvr>
+</p:notes>
+</file>
+
+<file path=ppt/notesSlides/notesSlide4.xml><?xml version="1.0" encoding="utf-8"?>
 <p:notes xmlns:a="http://schemas.openxmlformats.org/drawingml/2006/main" xmlns:r="http://schemas.openxmlformats.org/officeDocument/2006/relationships" xmlns:p="http://schemas.openxmlformats.org/presentationml/2006/main" showMasterSp="0" showMasterPhAnim="0">
   <p:cSld>
     <p:spTree>
@@ -2978,7 +5094,7 @@
 </p:notes>
 </file>
 
-<file path=ppt/notesSlides/notesSlide4.xml><?xml version="1.0" encoding="utf-8"?>
+<file path=ppt/notesSlides/notesSlide5.xml><?xml version="1.0" encoding="utf-8"?>
 <p:notes xmlns:a="http://schemas.openxmlformats.org/drawingml/2006/main" xmlns:r="http://schemas.openxmlformats.org/officeDocument/2006/relationships" xmlns:p="http://schemas.openxmlformats.org/presentationml/2006/main" showMasterSp="0" showMasterPhAnim="0">
   <p:cSld>
     <p:spTree>
@@ -3126,7 +5242,7 @@
 </p:notes>
 </file>
 
-<file path=ppt/notesSlides/notesSlide5.xml><?xml version="1.0" encoding="utf-8"?>
+<file path=ppt/notesSlides/notesSlide6.xml><?xml version="1.0" encoding="utf-8"?>
 <p:notes xmlns:a="http://schemas.openxmlformats.org/drawingml/2006/main" xmlns:r="http://schemas.openxmlformats.org/officeDocument/2006/relationships" xmlns:p="http://schemas.openxmlformats.org/presentationml/2006/main" showMasterSp="0" showMasterPhAnim="0">
   <p:cSld>
     <p:spTree>
@@ -3386,7 +5502,7 @@
 </p:notes>
 </file>
 
-<file path=ppt/notesSlides/notesSlide6.xml><?xml version="1.0" encoding="utf-8"?>
+<file path=ppt/notesSlides/notesSlide7.xml><?xml version="1.0" encoding="utf-8"?>
 <p:notes xmlns:a="http://schemas.openxmlformats.org/drawingml/2006/main" xmlns:r="http://schemas.openxmlformats.org/officeDocument/2006/relationships" xmlns:p="http://schemas.openxmlformats.org/presentationml/2006/main" showMasterSp="0" showMasterPhAnim="0">
   <p:cSld>
     <p:spTree>
@@ -3721,7 +5837,7 @@
 </p:notes>
 </file>
 
-<file path=ppt/notesSlides/notesSlide7.xml><?xml version="1.0" encoding="utf-8"?>
+<file path=ppt/notesSlides/notesSlide8.xml><?xml version="1.0" encoding="utf-8"?>
 <p:notes xmlns:a="http://schemas.openxmlformats.org/drawingml/2006/main" xmlns:r="http://schemas.openxmlformats.org/officeDocument/2006/relationships" xmlns:p="http://schemas.openxmlformats.org/presentationml/2006/main" showMasterSp="0" showMasterPhAnim="0">
   <p:cSld>
     <p:spTree>
@@ -4089,7 +6205,7 @@
 </p:notes>
 </file>
 
-<file path=ppt/notesSlides/notesSlide8.xml><?xml version="1.0" encoding="utf-8"?>
+<file path=ppt/notesSlides/notesSlide9.xml><?xml version="1.0" encoding="utf-8"?>
 <p:notes xmlns:a="http://schemas.openxmlformats.org/drawingml/2006/main" xmlns:r="http://schemas.openxmlformats.org/officeDocument/2006/relationships" xmlns:p="http://schemas.openxmlformats.org/presentationml/2006/main" showMasterSp="0" showMasterPhAnim="0">
   <p:cSld>
     <p:spTree>
@@ -4150,578 +6266,6 @@
       <p:sp>
         <p:nvSpPr>
           <p:cNvPr id="142" name="Shape 142"/>
-          <p:cNvSpPr txBox="1">
-            <a:spLocks noGrp="1"/>
-          </p:cNvSpPr>
-          <p:nvPr>
-            <p:ph type="body" idx="1"/>
-          </p:nvPr>
-        </p:nvSpPr>
-        <p:spPr>
-          <a:xfrm>
-            <a:off x="685800" y="4343400"/>
-            <a:ext cx="5486399" cy="4114800"/>
-          </a:xfrm>
-          <a:prstGeom prst="rect">
-            <a:avLst/>
-          </a:prstGeom>
-        </p:spPr>
-        <p:txBody>
-          <a:bodyPr lIns="91425" tIns="91425" rIns="91425" bIns="91425" anchor="t" anchorCtr="0">
-            <a:noAutofit/>
-          </a:bodyPr>
-          <a:lstStyle/>
-          <a:p>
-            <a:pPr lvl="0" rtl="0">
-              <a:lnSpc>
-                <a:spcPct val="115000"/>
-              </a:lnSpc>
-              <a:buClr>
-                <a:schemeClr val="dk1"/>
-              </a:buClr>
-              <a:buSzPct val="110000"/>
-              <a:buFont typeface="Arial"/>
-              <a:buNone/>
-            </a:pPr>
-            <a:r>
-              <a:rPr lang="en" sz="1000">
-                <a:solidFill>
-                  <a:schemeClr val="dk1"/>
-                </a:solidFill>
-              </a:rPr>
-              <a:t>Introduce Test-Driven Development and contrast it with the traditional test-last approach. Discuss the </a:t>
-            </a:r>
-          </a:p>
-          <a:p>
-            <a:pPr lvl="0" rtl="0">
-              <a:lnSpc>
-                <a:spcPct val="115000"/>
-              </a:lnSpc>
-              <a:buNone/>
-            </a:pPr>
-            <a:r>
-              <a:rPr lang="en" sz="1000">
-                <a:solidFill>
-                  <a:schemeClr val="dk1"/>
-                </a:solidFill>
-              </a:rPr>
-              <a:t>benefits and process of TDD and how it can lead to better overall design and simplicity. Topics include:</a:t>
-            </a:r>
-          </a:p>
-          <a:p>
-            <a:endParaRPr lang="en" sz="1000">
-              <a:solidFill>
-                <a:schemeClr val="dk1"/>
-              </a:solidFill>
-            </a:endParaRPr>
-          </a:p>
-          <a:p>
-            <a:pPr lvl="0" rtl="0">
-              <a:lnSpc>
-                <a:spcPct val="115000"/>
-              </a:lnSpc>
-              <a:buClr>
-                <a:schemeClr val="dk1"/>
-              </a:buClr>
-              <a:buSzPct val="110000"/>
-              <a:buFont typeface="Arial"/>
-              <a:buNone/>
-            </a:pPr>
-            <a:r>
-              <a:rPr lang="en" sz="1000">
-                <a:solidFill>
-                  <a:schemeClr val="dk1"/>
-                </a:solidFill>
-              </a:rPr>
-              <a:t>Test First (Test Driven) vs. Test After - 5 minutes</a:t>
-            </a:r>
-          </a:p>
-          <a:p>
-            <a:pPr marL="457200" lvl="0" indent="0" rtl="0">
-              <a:lnSpc>
-                <a:spcPct val="115000"/>
-              </a:lnSpc>
-              <a:buClr>
-                <a:schemeClr val="dk1"/>
-              </a:buClr>
-              <a:buSzPct val="110000"/>
-              <a:buFont typeface="Arial"/>
-              <a:buNone/>
-            </a:pPr>
-            <a:r>
-              <a:rPr lang="en" sz="1000">
-                <a:solidFill>
-                  <a:schemeClr val="dk1"/>
-                </a:solidFill>
-              </a:rPr>
-              <a:t>• What’s the difference? See: Thesis Conclusions</a:t>
-            </a:r>
-          </a:p>
-          <a:p>
-            <a:endParaRPr lang="en" sz="1000">
-              <a:solidFill>
-                <a:schemeClr val="dk1"/>
-              </a:solidFill>
-            </a:endParaRPr>
-          </a:p>
-          <a:p>
-            <a:pPr marL="457200" lvl="0" indent="0" rtl="0">
-              <a:lnSpc>
-                <a:spcPct val="115000"/>
-              </a:lnSpc>
-              <a:buClr>
-                <a:schemeClr val="dk1"/>
-              </a:buClr>
-              <a:buSzPct val="110000"/>
-              <a:buFont typeface="Arial"/>
-              <a:buNone/>
-            </a:pPr>
-            <a:r>
-              <a:rPr lang="en" sz="1000">
-                <a:solidFill>
-                  <a:schemeClr val="dk1"/>
-                </a:solidFill>
-              </a:rPr>
-              <a:t>To make a long story short:				</a:t>
-            </a:r>
-          </a:p>
-          <a:p>
-            <a:pPr marL="914400" lvl="0" indent="-292100" rtl="0">
-              <a:lnSpc>
-                <a:spcPct val="115000"/>
-              </a:lnSpc>
-              <a:buClr>
-                <a:schemeClr val="dk1"/>
-              </a:buClr>
-              <a:buSzPct val="100000"/>
-              <a:buFont typeface="Arial"/>
-              <a:buAutoNum type="arabicPeriod"/>
-            </a:pPr>
-            <a:r>
-              <a:rPr lang="en" sz="1000">
-                <a:solidFill>
-                  <a:schemeClr val="dk1"/>
-                </a:solidFill>
-              </a:rPr>
-              <a:t>Test-Driven Development offered an overall improvement of 21% over code written using the test-last technique. 				</a:t>
-            </a:r>
-          </a:p>
-          <a:p>
-            <a:pPr marL="914400" lvl="0" indent="-292100" rtl="0">
-              <a:lnSpc>
-                <a:spcPct val="115000"/>
-              </a:lnSpc>
-              <a:buClr>
-                <a:schemeClr val="dk1"/>
-              </a:buClr>
-              <a:buSzPct val="100000"/>
-              <a:buFont typeface="Arial"/>
-              <a:buAutoNum type="arabicPeriod"/>
-            </a:pPr>
-            <a:r>
-              <a:rPr lang="en" sz="1000">
-                <a:solidFill>
-                  <a:schemeClr val="dk1"/>
-                </a:solidFill>
-              </a:rPr>
-              <a:t>Test-Driven Development was most effective at decreasing the complexity of the code, with an improvement of 31%. </a:t>
-            </a:r>
-          </a:p>
-          <a:p>
-            <a:pPr marL="914400" lvl="0" indent="-292100" rtl="0">
-              <a:lnSpc>
-                <a:spcPct val="115000"/>
-              </a:lnSpc>
-              <a:buClr>
-                <a:schemeClr val="dk1"/>
-              </a:buClr>
-              <a:buSzPct val="100000"/>
-              <a:buFont typeface="Arial"/>
-              <a:buAutoNum type="arabicPeriod"/>
-            </a:pPr>
-            <a:r>
-              <a:rPr lang="en" sz="1000">
-                <a:solidFill>
-                  <a:schemeClr val="dk1"/>
-                </a:solidFill>
-              </a:rPr>
-              <a:t>The next-best improvement was on cohesion metrics, an improvement of 21%. </a:t>
-            </a:r>
-          </a:p>
-          <a:p>
-            <a:pPr marL="914400" lvl="0" indent="-292100" rtl="0">
-              <a:lnSpc>
-                <a:spcPct val="115000"/>
-              </a:lnSpc>
-              <a:buClr>
-                <a:schemeClr val="dk1"/>
-              </a:buClr>
-              <a:buSzPct val="100000"/>
-              <a:buFont typeface="Arial"/>
-              <a:buAutoNum type="arabicPeriod"/>
-            </a:pPr>
-            <a:r>
-              <a:rPr lang="en" sz="1000">
-                <a:solidFill>
-                  <a:schemeClr val="dk1"/>
-                </a:solidFill>
-              </a:rPr>
-              <a:t>The smallest improvement Test-Driven Development offered was on coupling metrics, only 10%. Miller (2008) explains that tight coupling means that modules and subsystems must know the details of other modules and subsystems in order to function. This means that, for tightly coupled systems, in order to write tests that verify whether a module or subsystem functions correctly, the test must also involve the details of other modules and subsystems. Essentially, tests become harder and harder to write the more tightly coupled the different parts of the system are. As explained by Tate and Gehtland (2004), the best defense against high system coupling is writing tests. </a:t>
-            </a:r>
-          </a:p>
-          <a:p>
-            <a:endParaRPr lang="en" sz="1000">
-              <a:solidFill>
-                <a:schemeClr val="dk1"/>
-              </a:solidFill>
-            </a:endParaRPr>
-          </a:p>
-          <a:p>
-            <a:pPr marL="457200" lvl="0" indent="0" rtl="0">
-              <a:lnSpc>
-                <a:spcPct val="115000"/>
-              </a:lnSpc>
-              <a:buClr>
-                <a:schemeClr val="dk1"/>
-              </a:buClr>
-              <a:buSzPct val="110000"/>
-              <a:buFont typeface="Arial"/>
-              <a:buNone/>
-            </a:pPr>
-            <a:r>
-              <a:rPr lang="en" sz="1000">
-                <a:solidFill>
-                  <a:schemeClr val="dk1"/>
-                </a:solidFill>
-              </a:rPr>
-              <a:t>• If I test after I still have the “safety net” right? Let’s talk about test coverage.</a:t>
-            </a:r>
-          </a:p>
-          <a:p>
-            <a:endParaRPr lang="en" sz="1000">
-              <a:solidFill>
-                <a:schemeClr val="dk1"/>
-              </a:solidFill>
-            </a:endParaRPr>
-          </a:p>
-          <a:p>
-            <a:pPr marL="457200" lvl="0" indent="0" rtl="0">
-              <a:lnSpc>
-                <a:spcPct val="115000"/>
-              </a:lnSpc>
-              <a:buClr>
-                <a:schemeClr val="dk1"/>
-              </a:buClr>
-              <a:buSzPct val="110000"/>
-              <a:buFont typeface="Arial"/>
-              <a:buNone/>
-            </a:pPr>
-            <a:r>
-              <a:rPr lang="en" sz="1000">
-                <a:solidFill>
-                  <a:schemeClr val="dk1"/>
-                </a:solidFill>
-              </a:rPr>
-              <a:t>Gaps in coverage mean gaps in the net. </a:t>
-            </a:r>
-          </a:p>
-          <a:p>
-            <a:endParaRPr lang="en" sz="1000">
-              <a:solidFill>
-                <a:schemeClr val="dk1"/>
-              </a:solidFill>
-            </a:endParaRPr>
-          </a:p>
-          <a:p>
-            <a:pPr marL="457200" lvl="0" indent="0" rtl="0">
-              <a:lnSpc>
-                <a:spcPct val="115000"/>
-              </a:lnSpc>
-              <a:buClr>
-                <a:schemeClr val="dk1"/>
-              </a:buClr>
-              <a:buSzPct val="110000"/>
-              <a:buFont typeface="Arial"/>
-              <a:buNone/>
-            </a:pPr>
-            <a:r>
-              <a:rPr lang="en" sz="1000">
-                <a:solidFill>
-                  <a:schemeClr val="dk1"/>
-                </a:solidFill>
-              </a:rPr>
-              <a:t>• Do you think your design and implementation will be the same?</a:t>
-            </a:r>
-          </a:p>
-          <a:p>
-            <a:endParaRPr lang="en" sz="1000">
-              <a:solidFill>
-                <a:schemeClr val="dk1"/>
-              </a:solidFill>
-            </a:endParaRPr>
-          </a:p>
-          <a:p>
-            <a:pPr marL="457200" lvl="0" indent="0" rtl="0">
-              <a:lnSpc>
-                <a:spcPct val="115000"/>
-              </a:lnSpc>
-              <a:buClr>
-                <a:schemeClr val="dk1"/>
-              </a:buClr>
-              <a:buSzPct val="110000"/>
-              <a:buFont typeface="Arial"/>
-              <a:buNone/>
-            </a:pPr>
-            <a:r>
-              <a:rPr lang="en" sz="1000">
-                <a:solidFill>
-                  <a:schemeClr val="dk1"/>
-                </a:solidFill>
-              </a:rPr>
-              <a:t>Why do you think complexity was decreased by 31%?</a:t>
-            </a:r>
-          </a:p>
-          <a:p>
-            <a:pPr marL="914400" lvl="0" indent="-292100" rtl="0">
-              <a:lnSpc>
-                <a:spcPct val="115000"/>
-              </a:lnSpc>
-              <a:buClr>
-                <a:schemeClr val="dk1"/>
-              </a:buClr>
-              <a:buSzPct val="100000"/>
-              <a:buFont typeface="Arial"/>
-              <a:buChar char="●"/>
-            </a:pPr>
-            <a:r>
-              <a:rPr lang="en" sz="1000">
-                <a:solidFill>
-                  <a:schemeClr val="dk1"/>
-                </a:solidFill>
-              </a:rPr>
-              <a:t>TDD forces you to think smaller and simpler</a:t>
-            </a:r>
-          </a:p>
-          <a:p>
-            <a:pPr marL="914400" lvl="0" indent="-292100" rtl="0">
-              <a:lnSpc>
-                <a:spcPct val="115000"/>
-              </a:lnSpc>
-              <a:buClr>
-                <a:schemeClr val="dk1"/>
-              </a:buClr>
-              <a:buSzPct val="100000"/>
-              <a:buFont typeface="Arial"/>
-              <a:buChar char="●"/>
-            </a:pPr>
-            <a:r>
-              <a:rPr lang="en" sz="1000">
-                <a:solidFill>
-                  <a:schemeClr val="dk1"/>
-                </a:solidFill>
-              </a:rPr>
-              <a:t>TDD allows you to refactor fearlessly (we will get to that in a minute)</a:t>
-            </a:r>
-          </a:p>
-          <a:p>
-            <a:endParaRPr lang="en" sz="1000">
-              <a:solidFill>
-                <a:schemeClr val="dk1"/>
-              </a:solidFill>
-            </a:endParaRPr>
-          </a:p>
-          <a:p>
-            <a:pPr lvl="0" rtl="0">
-              <a:lnSpc>
-                <a:spcPct val="115000"/>
-              </a:lnSpc>
-              <a:buClr>
-                <a:schemeClr val="dk1"/>
-              </a:buClr>
-              <a:buSzPct val="110000"/>
-              <a:buFont typeface="Arial"/>
-              <a:buNone/>
-            </a:pPr>
-            <a:r>
-              <a:rPr lang="en" sz="1000">
-                <a:solidFill>
-                  <a:schemeClr val="dk1"/>
-                </a:solidFill>
-              </a:rPr>
-              <a:t>	Why improvement in cohesion and coupling?</a:t>
-            </a:r>
-          </a:p>
-          <a:p>
-            <a:pPr marL="914400" lvl="0" indent="-292100" rtl="0">
-              <a:lnSpc>
-                <a:spcPct val="115000"/>
-              </a:lnSpc>
-              <a:buClr>
-                <a:schemeClr val="dk1"/>
-              </a:buClr>
-              <a:buSzPct val="100000"/>
-              <a:buFont typeface="Arial"/>
-              <a:buChar char="●"/>
-            </a:pPr>
-            <a:r>
-              <a:rPr lang="en" sz="1000">
-                <a:solidFill>
-                  <a:schemeClr val="dk1"/>
-                </a:solidFill>
-              </a:rPr>
-              <a:t>Recall that cohesion is essentially a measure of how related all of the responsibilities of a module are.  Instead of writing big classes with many lines of code, TDD encourages developers to write simple and small classes, and use the power of object orientation mechanisms to put all the classes together. </a:t>
-            </a:r>
-          </a:p>
-          <a:p>
-            <a:pPr marL="914400" lvl="0" indent="-292100" rtl="0">
-              <a:lnSpc>
-                <a:spcPct val="115000"/>
-              </a:lnSpc>
-              <a:buClr>
-                <a:schemeClr val="dk1"/>
-              </a:buClr>
-              <a:buSzPct val="100000"/>
-              <a:buFont typeface="Arial"/>
-              <a:buChar char="●"/>
-            </a:pPr>
-            <a:r>
-              <a:rPr lang="en" sz="1000">
-                <a:solidFill>
-                  <a:schemeClr val="dk1"/>
-                </a:solidFill>
-              </a:rPr>
-              <a:t>In regards to the 10% reduction in coupling.  In order to test, TDD encourages developers to follow some good object orientation principles: classes explicit their dependencies, and therefore become opened for extensions; coupling usually tend to be to high-level stable interfaces, reducing the risk of a modiﬁcation caused by changes in any dependency.</a:t>
-            </a:r>
-          </a:p>
-          <a:p>
-            <a:endParaRPr lang="en" sz="1000">
-              <a:solidFill>
-                <a:schemeClr val="dk1"/>
-              </a:solidFill>
-            </a:endParaRPr>
-          </a:p>
-          <a:p>
-            <a:endParaRPr lang="en" sz="1000">
-              <a:solidFill>
-                <a:schemeClr val="dk1"/>
-              </a:solidFill>
-            </a:endParaRPr>
-          </a:p>
-          <a:p>
-            <a:pPr lvl="0" rtl="0">
-              <a:lnSpc>
-                <a:spcPct val="115000"/>
-              </a:lnSpc>
-              <a:buClr>
-                <a:schemeClr val="dk1"/>
-              </a:buClr>
-              <a:buSzPct val="110000"/>
-              <a:buFont typeface="Arial"/>
-              <a:buNone/>
-            </a:pPr>
-            <a:r>
-              <a:rPr lang="en" sz="1000">
-                <a:solidFill>
-                  <a:schemeClr val="dk1"/>
-                </a:solidFill>
-              </a:rPr>
-              <a:t>See: How Test-Driven Development Inﬂuences Class Design: A Practitioner’s Point of View, </a:t>
-            </a:r>
-            <a:r>
-              <a:rPr lang="en" sz="1000" i="1">
-                <a:solidFill>
-                  <a:schemeClr val="dk1"/>
-                </a:solidFill>
-              </a:rPr>
-              <a:t>Mauricio Finavaro Aniche, Marco Aurelio Gerosa.</a:t>
-            </a:r>
-            <a:r>
-              <a:rPr lang="en" sz="1000">
-                <a:solidFill>
-                  <a:schemeClr val="dk1"/>
-                </a:solidFill>
-              </a:rPr>
-              <a:t> http://www.ime.usp.br/~aniche/files/tdd-and-design-draft.pdf</a:t>
-            </a:r>
-          </a:p>
-          <a:p>
-            <a:endParaRPr lang="en" sz="1000">
-              <a:solidFill>
-                <a:schemeClr val="dk1"/>
-              </a:solidFill>
-            </a:endParaRPr>
-          </a:p>
-        </p:txBody>
-      </p:sp>
-    </p:spTree>
-  </p:cSld>
-  <p:clrMapOvr>
-    <a:masterClrMapping/>
-  </p:clrMapOvr>
-</p:notes>
-</file>
-
-<file path=ppt/notesSlides/notesSlide9.xml><?xml version="1.0" encoding="utf-8"?>
-<p:notes xmlns:a="http://schemas.openxmlformats.org/drawingml/2006/main" xmlns:r="http://schemas.openxmlformats.org/officeDocument/2006/relationships" xmlns:p="http://schemas.openxmlformats.org/presentationml/2006/main" showMasterSp="0" showMasterPhAnim="0">
-  <p:cSld>
-    <p:spTree>
-      <p:nvGrpSpPr>
-        <p:cNvPr id="1" name="Shape 147"/>
-        <p:cNvGrpSpPr/>
-        <p:nvPr/>
-      </p:nvGrpSpPr>
-      <p:grpSpPr>
-        <a:xfrm>
-          <a:off x="0" y="0"/>
-          <a:ext cx="0" cy="0"/>
-          <a:chOff x="0" y="0"/>
-          <a:chExt cx="0" cy="0"/>
-        </a:xfrm>
-      </p:grpSpPr>
-      <p:sp>
-        <p:nvSpPr>
-          <p:cNvPr id="148" name="Shape 148"/>
-          <p:cNvSpPr>
-            <a:spLocks noGrp="1" noRot="1" noChangeAspect="1"/>
-          </p:cNvSpPr>
-          <p:nvPr>
-            <p:ph type="sldImg" idx="2"/>
-          </p:nvPr>
-        </p:nvSpPr>
-        <p:spPr>
-          <a:xfrm>
-            <a:off x="1143225" y="685800"/>
-            <a:ext cx="4572299" cy="3429000"/>
-          </a:xfrm>
-          <a:custGeom>
-            <a:avLst/>
-            <a:gdLst/>
-            <a:ahLst/>
-            <a:cxnLst/>
-            <a:rect l="0" t="0" r="0" b="0"/>
-            <a:pathLst>
-              <a:path w="120000" h="120000" extrusionOk="0">
-                <a:moveTo>
-                  <a:pt x="0" y="0"/>
-                </a:moveTo>
-                <a:lnTo>
-                  <a:pt x="120000" y="0"/>
-                </a:lnTo>
-                <a:lnTo>
-                  <a:pt x="120000" y="120000"/>
-                </a:lnTo>
-                <a:lnTo>
-                  <a:pt x="0" y="120000"/>
-                </a:lnTo>
-                <a:close/>
-              </a:path>
-            </a:pathLst>
-          </a:custGeom>
-        </p:spPr>
-      </p:sp>
-      <p:sp>
-        <p:nvSpPr>
-          <p:cNvPr id="149" name="Shape 149"/>
           <p:cNvSpPr txBox="1">
             <a:spLocks noGrp="1"/>
           </p:cNvSpPr>
@@ -8605,7 +10149,7 @@
         <p:spPr>
           <a:xfrm>
             <a:off x="685800" y="2266575"/>
-            <a:ext cx="6400799" cy="1333799"/>
+            <a:ext cx="6711950" cy="1333799"/>
           </a:xfrm>
           <a:prstGeom prst="rect">
             <a:avLst/>
@@ -8621,8 +10165,20 @@
               <a:buNone/>
             </a:pPr>
             <a:r>
-              <a:rPr lang="en"/>
-              <a:t>Learning to Test Drive</a:t>
+              <a:rPr lang="en" dirty="0"/>
+              <a:t>Learning to </a:t>
+            </a:r>
+            <a:r>
+              <a:rPr lang="en-US" dirty="0" smtClean="0"/>
+              <a:t>@</a:t>
+            </a:r>
+            <a:r>
+              <a:rPr lang="en" dirty="0" smtClean="0"/>
+              <a:t>Test </a:t>
+            </a:r>
+            <a:r>
+              <a:rPr lang="en" dirty="0"/>
+              <a:t>Drive</a:t>
             </a:r>
           </a:p>
         </p:txBody>
@@ -8674,6 +10230,173 @@
 </file>
 
 <file path=ppt/slides/slide10.xml><?xml version="1.0" encoding="utf-8"?>
+<p:sld xmlns:a="http://schemas.openxmlformats.org/drawingml/2006/main" xmlns:r="http://schemas.openxmlformats.org/officeDocument/2006/relationships" xmlns:p="http://schemas.openxmlformats.org/presentationml/2006/main">
+  <p:cSld>
+    <p:spTree>
+      <p:nvGrpSpPr>
+        <p:cNvPr id="1" name="Shape 143"/>
+        <p:cNvGrpSpPr/>
+        <p:nvPr/>
+      </p:nvGrpSpPr>
+      <p:grpSpPr>
+        <a:xfrm>
+          <a:off x="0" y="0"/>
+          <a:ext cx="0" cy="0"/>
+          <a:chOff x="0" y="0"/>
+          <a:chExt cx="0" cy="0"/>
+        </a:xfrm>
+      </p:grpSpPr>
+      <p:sp>
+        <p:nvSpPr>
+          <p:cNvPr id="144" name="Shape 144"/>
+          <p:cNvSpPr txBox="1">
+            <a:spLocks noGrp="1"/>
+          </p:cNvSpPr>
+          <p:nvPr>
+            <p:ph type="title"/>
+          </p:nvPr>
+        </p:nvSpPr>
+        <p:spPr>
+          <a:xfrm>
+            <a:off x="457200" y="134800"/>
+            <a:ext cx="8128799" cy="1351799"/>
+          </a:xfrm>
+          <a:prstGeom prst="rect">
+            <a:avLst/>
+          </a:prstGeom>
+        </p:spPr>
+        <p:txBody>
+          <a:bodyPr lIns="91425" tIns="91425" rIns="91425" bIns="91425" anchor="b" anchorCtr="0">
+            <a:noAutofit/>
+          </a:bodyPr>
+          <a:lstStyle/>
+          <a:p>
+            <a:pPr lvl="0" rtl="0">
+              <a:buNone/>
+            </a:pPr>
+            <a:r>
+              <a:rPr lang="en" sz="3600" b="1">
+                <a:solidFill>
+                  <a:srgbClr val="FFFFFF"/>
+                </a:solidFill>
+              </a:rPr>
+              <a:t>Secondly – Now for some action:</a:t>
+            </a:r>
+            <a:r>
+              <a:rPr lang="en" sz="1000">
+                <a:solidFill>
+                  <a:schemeClr val="dk1"/>
+                </a:solidFill>
+              </a:rPr>
+              <a:t>T</a:t>
+            </a:r>
+          </a:p>
+          <a:p>
+            <a:pPr lvl="0" rtl="0">
+              <a:buNone/>
+            </a:pPr>
+            <a:r>
+              <a:rPr lang="en" sz="3000">
+                <a:solidFill>
+                  <a:srgbClr val="FFFFFF"/>
+                </a:solidFill>
+              </a:rPr>
+              <a:t>Test First (Test Driven) vs. Test After</a:t>
+            </a:r>
+          </a:p>
+        </p:txBody>
+      </p:sp>
+      <p:sp>
+        <p:nvSpPr>
+          <p:cNvPr id="145" name="Shape 145"/>
+          <p:cNvSpPr txBox="1">
+            <a:spLocks noGrp="1"/>
+          </p:cNvSpPr>
+          <p:nvPr>
+            <p:ph type="body" idx="1"/>
+          </p:nvPr>
+        </p:nvSpPr>
+        <p:spPr>
+          <a:xfrm>
+            <a:off x="152400" y="1704688"/>
+            <a:ext cx="8229600" cy="4840199"/>
+          </a:xfrm>
+          <a:prstGeom prst="rect">
+            <a:avLst/>
+          </a:prstGeom>
+        </p:spPr>
+        <p:txBody>
+          <a:bodyPr lIns="91425" tIns="91425" rIns="91425" bIns="91425" anchor="t" anchorCtr="0">
+            <a:noAutofit/>
+          </a:bodyPr>
+          <a:lstStyle/>
+          <a:p>
+            <a:pPr lvl="0" rtl="0">
+              <a:buNone/>
+            </a:pPr>
+            <a:r>
+              <a:rPr lang="en">
+                <a:solidFill>
+                  <a:srgbClr val="073763"/>
+                </a:solidFill>
+              </a:rPr>
+              <a:t>Code Coverage Example</a:t>
+            </a:r>
+          </a:p>
+          <a:p>
+            <a:endParaRPr lang="en">
+              <a:solidFill>
+                <a:srgbClr val="073763"/>
+              </a:solidFill>
+            </a:endParaRPr>
+          </a:p>
+          <a:p>
+            <a:endParaRPr lang="en">
+              <a:solidFill>
+                <a:srgbClr val="073763"/>
+              </a:solidFill>
+            </a:endParaRPr>
+          </a:p>
+        </p:txBody>
+      </p:sp>
+      <p:pic>
+        <p:nvPicPr>
+          <p:cNvPr id="146" name="Shape 146"/>
+          <p:cNvPicPr preferRelativeResize="0"/>
+          <p:nvPr/>
+        </p:nvPicPr>
+        <p:blipFill>
+          <a:blip r:embed="rId3"/>
+          <a:stretch>
+            <a:fillRect/>
+          </a:stretch>
+        </p:blipFill>
+        <p:spPr>
+          <a:xfrm>
+            <a:off x="1021425" y="2274650"/>
+            <a:ext cx="7107374" cy="4307049"/>
+          </a:xfrm>
+          <a:prstGeom prst="rect">
+            <a:avLst/>
+          </a:prstGeom>
+          <a:noFill/>
+          <a:ln>
+            <a:noFill/>
+          </a:ln>
+        </p:spPr>
+      </p:pic>
+    </p:spTree>
+  </p:cSld>
+  <p:clrMapOvr>
+    <a:masterClrMapping/>
+  </p:clrMapOvr>
+  <p:transition xmlns:p14="http://schemas.microsoft.com/office/powerpoint/2010/main" spd="slow">
+    <p:cut/>
+  </p:transition>
+</p:sld>
+</file>
+
+<file path=ppt/slides/slide11.xml><?xml version="1.0" encoding="utf-8"?>
 <p:sld xmlns:a="http://schemas.openxmlformats.org/drawingml/2006/main" xmlns:r="http://schemas.openxmlformats.org/officeDocument/2006/relationships" xmlns:p="http://schemas.openxmlformats.org/presentationml/2006/main">
   <p:cSld>
     <p:spTree>
@@ -8909,7 +10632,7 @@
 </p:sld>
 </file>
 
-<file path=ppt/slides/slide11.xml><?xml version="1.0" encoding="utf-8"?>
+<file path=ppt/slides/slide12.xml><?xml version="1.0" encoding="utf-8"?>
 <p:sld xmlns:a="http://schemas.openxmlformats.org/drawingml/2006/main" xmlns:r="http://schemas.openxmlformats.org/officeDocument/2006/relationships" xmlns:p="http://schemas.openxmlformats.org/presentationml/2006/main">
   <p:cSld>
     <p:spTree>
@@ -9251,7 +10974,7 @@
 </p:sld>
 </file>
 
-<file path=ppt/slides/slide12.xml><?xml version="1.0" encoding="utf-8"?>
+<file path=ppt/slides/slide13.xml><?xml version="1.0" encoding="utf-8"?>
 <p:sld xmlns:a="http://schemas.openxmlformats.org/drawingml/2006/main" xmlns:r="http://schemas.openxmlformats.org/officeDocument/2006/relationships" xmlns:p="http://schemas.openxmlformats.org/presentationml/2006/main">
   <p:cSld>
     <p:spTree>
@@ -9536,7 +11259,7 @@
 </p:sld>
 </file>
 
-<file path=ppt/slides/slide13.xml><?xml version="1.0" encoding="utf-8"?>
+<file path=ppt/slides/slide14.xml><?xml version="1.0" encoding="utf-8"?>
 <p:sld xmlns:a="http://schemas.openxmlformats.org/drawingml/2006/main" xmlns:r="http://schemas.openxmlformats.org/officeDocument/2006/relationships" xmlns:p="http://schemas.openxmlformats.org/presentationml/2006/main">
   <p:cSld>
     <p:spTree>
@@ -9877,7 +11600,7 @@
 </p:sld>
 </file>
 
-<file path=ppt/slides/slide14.xml><?xml version="1.0" encoding="utf-8"?>
+<file path=ppt/slides/slide15.xml><?xml version="1.0" encoding="utf-8"?>
 <p:sld xmlns:a="http://schemas.openxmlformats.org/drawingml/2006/main" xmlns:r="http://schemas.openxmlformats.org/officeDocument/2006/relationships" xmlns:p="http://schemas.openxmlformats.org/presentationml/2006/main">
   <p:cSld>
     <p:spTree>
@@ -10134,7 +11857,7 @@
 </p:sld>
 </file>
 
-<file path=ppt/slides/slide15.xml><?xml version="1.0" encoding="utf-8"?>
+<file path=ppt/slides/slide16.xml><?xml version="1.0" encoding="utf-8"?>
 <p:sld xmlns:a="http://schemas.openxmlformats.org/drawingml/2006/main" xmlns:r="http://schemas.openxmlformats.org/officeDocument/2006/relationships" xmlns:p="http://schemas.openxmlformats.org/presentationml/2006/main">
   <p:cSld>
     <p:spTree>
@@ -10448,13 +12171,39 @@
               <a:buFont typeface="Arial"/>
               <a:buNone/>
             </a:pPr>
+            <a:endParaRPr lang="en-US" sz="1400" dirty="0" smtClean="0">
+              <a:solidFill>
+                <a:srgbClr val="073763"/>
+              </a:solidFill>
+            </a:endParaRPr>
+          </a:p>
+          <a:p>
+            <a:pPr lvl="0" rtl="0">
+              <a:spcAft>
+                <a:spcPts val="800"/>
+              </a:spcAft>
+              <a:buClr>
+                <a:schemeClr val="dk1"/>
+              </a:buClr>
+              <a:buSzPct val="78571"/>
+              <a:buFont typeface="Arial"/>
+              <a:buNone/>
+            </a:pPr>
+            <a:r>
+              <a:rPr lang="en" sz="1400" dirty="0" smtClean="0">
+                <a:solidFill>
+                  <a:srgbClr val="073763"/>
+                </a:solidFill>
+              </a:rPr>
+              <a:t>Before </a:t>
+            </a:r>
             <a:r>
               <a:rPr lang="en" sz="1400" dirty="0">
                 <a:solidFill>
                   <a:srgbClr val="073763"/>
                 </a:solidFill>
               </a:rPr>
-              <a:t>Before you start: </a:t>
+              <a:t>you start: </a:t>
             </a:r>
           </a:p>
           <a:p>
@@ -10573,10 +12322,16 @@
                   <a:srgbClr val="073763"/>
                 </a:solidFill>
               </a:rPr>
-              <a:t>. there is no need to test for invalid inputs for this kata</a:t>
-            </a:r>
-          </a:p>
-          <a:p>
+              <a:t>. there is no need to test for invalid inputs for this </a:t>
+            </a:r>
+            <a:r>
+              <a:rPr lang="en" sz="1400" dirty="0" smtClean="0">
+                <a:solidFill>
+                  <a:srgbClr val="073763"/>
+                </a:solidFill>
+              </a:rPr>
+              <a:t>kata</a:t>
+            </a:r>
             <a:endParaRPr lang="en" sz="1400" dirty="0">
               <a:solidFill>
                 <a:srgbClr val="073763"/>
@@ -10678,7 +12433,318 @@
 </p:sld>
 </file>
 
-<file path=ppt/slides/slide16.xml><?xml version="1.0" encoding="utf-8"?>
+<file path=ppt/slides/slide17.xml><?xml version="1.0" encoding="utf-8"?>
+<p:sld xmlns:a="http://schemas.openxmlformats.org/drawingml/2006/main" xmlns:r="http://schemas.openxmlformats.org/officeDocument/2006/relationships" xmlns:p="http://schemas.openxmlformats.org/presentationml/2006/main">
+  <p:cSld>
+    <p:spTree>
+      <p:nvGrpSpPr>
+        <p:cNvPr id="1" name="Shape 185"/>
+        <p:cNvGrpSpPr/>
+        <p:nvPr/>
+      </p:nvGrpSpPr>
+      <p:grpSpPr>
+        <a:xfrm>
+          <a:off x="0" y="0"/>
+          <a:ext cx="0" cy="0"/>
+          <a:chOff x="0" y="0"/>
+          <a:chExt cx="0" cy="0"/>
+        </a:xfrm>
+      </p:grpSpPr>
+      <p:sp>
+        <p:nvSpPr>
+          <p:cNvPr id="186" name="Shape 186"/>
+          <p:cNvSpPr txBox="1">
+            <a:spLocks noGrp="1"/>
+          </p:cNvSpPr>
+          <p:nvPr>
+            <p:ph type="title"/>
+          </p:nvPr>
+        </p:nvSpPr>
+        <p:spPr>
+          <a:xfrm>
+            <a:off x="457200" y="134800"/>
+            <a:ext cx="8183399" cy="1351799"/>
+          </a:xfrm>
+          <a:prstGeom prst="rect">
+            <a:avLst/>
+          </a:prstGeom>
+        </p:spPr>
+        <p:txBody>
+          <a:bodyPr lIns="91425" tIns="91425" rIns="91425" bIns="91425" anchor="b" anchorCtr="0">
+            <a:noAutofit/>
+          </a:bodyPr>
+          <a:lstStyle/>
+          <a:p>
+            <a:pPr lvl="0" rtl="0">
+              <a:buNone/>
+            </a:pPr>
+            <a:r>
+              <a:rPr lang="en" sz="3600" b="1" dirty="0">
+                <a:solidFill>
+                  <a:srgbClr val="FFFFFF"/>
+                </a:solidFill>
+              </a:rPr>
+              <a:t>Secondly – Now for some action: </a:t>
+            </a:r>
+            <a:r>
+              <a:rPr lang="en-US" sz="3000" dirty="0" smtClean="0">
+                <a:solidFill>
+                  <a:srgbClr val="FFFFFF"/>
+                </a:solidFill>
+              </a:rPr>
+              <a:t>String Calculator Kata</a:t>
+            </a:r>
+            <a:endParaRPr lang="en" sz="3000" dirty="0">
+              <a:solidFill>
+                <a:srgbClr val="FFFFFF"/>
+              </a:solidFill>
+            </a:endParaRPr>
+          </a:p>
+        </p:txBody>
+      </p:sp>
+      <p:sp>
+        <p:nvSpPr>
+          <p:cNvPr id="187" name="Shape 187"/>
+          <p:cNvSpPr txBox="1">
+            <a:spLocks noGrp="1"/>
+          </p:cNvSpPr>
+          <p:nvPr>
+            <p:ph type="body" idx="1"/>
+          </p:nvPr>
+        </p:nvSpPr>
+        <p:spPr>
+          <a:xfrm>
+            <a:off x="19049" y="1638025"/>
+            <a:ext cx="9124951" cy="5219975"/>
+          </a:xfrm>
+          <a:prstGeom prst="rect">
+            <a:avLst/>
+          </a:prstGeom>
+          <a:solidFill>
+            <a:schemeClr val="lt1"/>
+          </a:solidFill>
+        </p:spPr>
+        <p:txBody>
+          <a:bodyPr lIns="91425" tIns="91425" rIns="91425" bIns="91425" anchor="t" anchorCtr="0">
+            <a:noAutofit/>
+          </a:bodyPr>
+          <a:lstStyle/>
+          <a:p>
+            <a:r>
+              <a:rPr lang="en-US" sz="1400" dirty="0"/>
+              <a:t>1)  Create a simple String calculator with a method </a:t>
+            </a:r>
+            <a:r>
+              <a:rPr lang="en-US" sz="1400" dirty="0" err="1"/>
+              <a:t>int</a:t>
+            </a:r>
+            <a:r>
+              <a:rPr lang="en-US" sz="1400" dirty="0"/>
+              <a:t> A</a:t>
+            </a:r>
+            <a:r>
+              <a:rPr lang="en-US" sz="1400" dirty="0" smtClean="0"/>
+              <a:t>dd</a:t>
+            </a:r>
+            <a:r>
+              <a:rPr lang="en-US" sz="1400" dirty="0"/>
+              <a:t>(string numbers) </a:t>
+            </a:r>
+            <a:r>
+              <a:rPr lang="en-US" sz="1400" dirty="0" smtClean="0"/>
+              <a:t> (10-15 minutes)</a:t>
+            </a:r>
+            <a:endParaRPr lang="en-US" sz="1400" dirty="0"/>
+          </a:p>
+          <a:p>
+            <a:pPr lvl="1"/>
+            <a:r>
+              <a:rPr lang="en-US" sz="1400" dirty="0"/>
+              <a:t>a)  The method can take 0, 1 or 2 numbers, and will return their sum (for an empty string it will return 0) for example “” or “1” or “1,2” </a:t>
+            </a:r>
+          </a:p>
+          <a:p>
+            <a:pPr lvl="1"/>
+            <a:r>
+              <a:rPr lang="en-US" sz="1400" dirty="0"/>
+              <a:t>b)  Start with the simplest test case of an empty string and move to 1 and two numbers </a:t>
+            </a:r>
+          </a:p>
+          <a:p>
+            <a:pPr lvl="1"/>
+            <a:r>
+              <a:rPr lang="en-US" sz="1400" dirty="0"/>
+              <a:t>c)  Remember to solve things as simply as possible so that you force yourself to write tests </a:t>
+            </a:r>
+          </a:p>
+          <a:p>
+            <a:pPr lvl="1"/>
+            <a:r>
+              <a:rPr lang="en-US" sz="1400" dirty="0"/>
+              <a:t>you did not think about </a:t>
+            </a:r>
+          </a:p>
+          <a:p>
+            <a:pPr lvl="1"/>
+            <a:r>
+              <a:rPr lang="en-US" sz="1400" dirty="0"/>
+              <a:t>d)  Remember to refactor after each passing test </a:t>
+            </a:r>
+            <a:endParaRPr lang="en-US" sz="1400" dirty="0" smtClean="0"/>
+          </a:p>
+          <a:p>
+            <a:pPr lvl="1"/>
+            <a:endParaRPr lang="en-US" sz="1400" dirty="0" smtClean="0"/>
+          </a:p>
+          <a:p>
+            <a:r>
+              <a:rPr lang="en-US" sz="1400" dirty="0" smtClean="0"/>
+              <a:t>2</a:t>
+            </a:r>
+            <a:r>
+              <a:rPr lang="en-US" sz="1400" dirty="0"/>
+              <a:t>)  Allow the Add method to handle an unknown amount of numbers </a:t>
+            </a:r>
+            <a:r>
+              <a:rPr lang="en-US" sz="1400" dirty="0" smtClean="0"/>
+              <a:t>(5-10 minutes)</a:t>
+            </a:r>
+            <a:endParaRPr lang="en-US" sz="1400" dirty="0"/>
+          </a:p>
+          <a:p>
+            <a:endParaRPr lang="en-US" sz="1400" dirty="0" smtClean="0"/>
+          </a:p>
+          <a:p>
+            <a:r>
+              <a:rPr lang="en-US" sz="1400" dirty="0" smtClean="0"/>
+              <a:t>3</a:t>
+            </a:r>
+            <a:r>
+              <a:rPr lang="en-US" sz="1400" dirty="0"/>
+              <a:t>)  Allow the Add method to handle new lines between numbers (instead of commas). </a:t>
+            </a:r>
+            <a:r>
+              <a:rPr lang="en-US" sz="1400" dirty="0" smtClean="0"/>
+              <a:t>(5-10 minutes)</a:t>
+            </a:r>
+            <a:endParaRPr lang="en-US" sz="1400" dirty="0"/>
+          </a:p>
+          <a:p>
+            <a:pPr lvl="1"/>
+            <a:r>
+              <a:rPr lang="en-US" sz="1400" dirty="0"/>
+              <a:t>a)  the following input is ok: “1\n2,3” (will equal 6) </a:t>
+            </a:r>
+          </a:p>
+          <a:p>
+            <a:pPr lvl="1"/>
+            <a:r>
+              <a:rPr lang="en-US" sz="1400" dirty="0"/>
+              <a:t>b)  the following input is NOT ok: “1,\n” (not need to prove it - just clarifying) </a:t>
+            </a:r>
+          </a:p>
+          <a:p>
+            <a:endParaRPr lang="en-US" sz="1400" dirty="0" smtClean="0"/>
+          </a:p>
+          <a:p>
+            <a:r>
+              <a:rPr lang="en-US" sz="1400" dirty="0" smtClean="0"/>
+              <a:t>4</a:t>
+            </a:r>
+            <a:r>
+              <a:rPr lang="en-US" sz="1400" dirty="0"/>
+              <a:t>)  Support different delimiters </a:t>
+            </a:r>
+            <a:r>
+              <a:rPr lang="en-US" sz="1400" dirty="0" smtClean="0"/>
+              <a:t>(10-15 minutes)</a:t>
+            </a:r>
+            <a:endParaRPr lang="en-US" sz="1400" dirty="0"/>
+          </a:p>
+          <a:p>
+            <a:pPr lvl="1"/>
+            <a:r>
+              <a:rPr lang="en-US" sz="1400" dirty="0"/>
+              <a:t>a)  to change a delimiter, the beginning of the string will contain a separate line that looks like this: “//[delimiter]\n[numbers...]” for example “//;\n1;2” should return three where the default delimiter is ‘;’ . </a:t>
+            </a:r>
+          </a:p>
+          <a:p>
+            <a:pPr lvl="1"/>
+            <a:r>
+              <a:rPr lang="en-US" sz="1400" dirty="0"/>
+              <a:t>b)  the first line is optional. all existing scenarios should still be supported </a:t>
+            </a:r>
+          </a:p>
+          <a:p>
+            <a:endParaRPr lang="en-US" sz="1400" dirty="0" smtClean="0"/>
+          </a:p>
+          <a:p>
+            <a:r>
+              <a:rPr lang="en-US" sz="1400" dirty="0" smtClean="0"/>
+              <a:t>5</a:t>
+            </a:r>
+            <a:r>
+              <a:rPr lang="en-US" sz="1400" dirty="0"/>
+              <a:t>)  Calling Add with a negative number will throw an exception “negatives not allowed” </a:t>
+            </a:r>
+            <a:r>
+              <a:rPr lang="en-US" sz="1400" dirty="0" smtClean="0"/>
+              <a:t>– (10 minutes)</a:t>
+            </a:r>
+          </a:p>
+          <a:p>
+            <a:r>
+              <a:rPr lang="en-US" sz="1400" dirty="0"/>
+              <a:t>	</a:t>
+            </a:r>
+            <a:r>
+              <a:rPr lang="en-US" sz="1400" dirty="0" smtClean="0"/>
+              <a:t> </a:t>
+            </a:r>
+            <a:r>
+              <a:rPr lang="en-US" sz="1400" dirty="0"/>
+              <a:t>and the negative that was passed</a:t>
+            </a:r>
+            <a:r>
+              <a:rPr lang="en-US" sz="1400" dirty="0" smtClean="0"/>
+              <a:t>. if </a:t>
+            </a:r>
+            <a:r>
+              <a:rPr lang="en-US" sz="1400" dirty="0"/>
+              <a:t>there are multiple negatives, show all of them in the </a:t>
+            </a:r>
+            <a:r>
+              <a:rPr lang="en-US" sz="1400" dirty="0" smtClean="0"/>
+              <a:t>exception message </a:t>
+            </a:r>
+            <a:endParaRPr lang="en-US" sz="1400" dirty="0"/>
+          </a:p>
+          <a:p>
+            <a:endParaRPr lang="pt-BR" sz="1400" dirty="0" smtClean="0">
+              <a:solidFill>
+                <a:srgbClr val="073763"/>
+              </a:solidFill>
+            </a:endParaRPr>
+          </a:p>
+        </p:txBody>
+      </p:sp>
+    </p:spTree>
+    <p:extLst>
+      <p:ext uri="{BB962C8B-B14F-4D97-AF65-F5344CB8AC3E}">
+        <p14:creationId xmlns:p14="http://schemas.microsoft.com/office/powerpoint/2010/main" val="3449023271"/>
+      </p:ext>
+    </p:extLst>
+  </p:cSld>
+  <p:clrMapOvr>
+    <a:masterClrMapping/>
+  </p:clrMapOvr>
+  <p:transition xmlns:p14="http://schemas.microsoft.com/office/powerpoint/2010/main" spd="slow">
+    <p:cut/>
+  </p:transition>
+</p:sld>
+</file>
+
+<file path=ppt/slides/slide18.xml><?xml version="1.0" encoding="utf-8"?>
 <p:sld xmlns:a="http://schemas.openxmlformats.org/drawingml/2006/main" xmlns:r="http://schemas.openxmlformats.org/officeDocument/2006/relationships" xmlns:p="http://schemas.openxmlformats.org/presentationml/2006/main">
   <p:cSld>
     <p:spTree>
@@ -10844,13 +12910,40 @@
               </a:spcAft>
               <a:buNone/>
             </a:pPr>
+            <a:endParaRPr lang="en-US" dirty="0" smtClean="0">
+              <a:solidFill>
+                <a:srgbClr val="073763"/>
+              </a:solidFill>
+            </a:endParaRPr>
+          </a:p>
+          <a:p>
+            <a:pPr lvl="0" rtl="0">
+              <a:lnSpc>
+                <a:spcPct val="126000"/>
+              </a:lnSpc>
+              <a:spcBef>
+                <a:spcPts val="1100"/>
+              </a:spcBef>
+              <a:spcAft>
+                <a:spcPts val="1100"/>
+              </a:spcAft>
+              <a:buNone/>
+            </a:pPr>
+            <a:r>
+              <a:rPr lang="en" dirty="0" smtClean="0">
+                <a:solidFill>
+                  <a:srgbClr val="073763"/>
+                </a:solidFill>
+              </a:rPr>
+              <a:t>When </a:t>
+            </a:r>
             <a:r>
               <a:rPr lang="en" dirty="0">
                 <a:solidFill>
                   <a:srgbClr val="073763"/>
                 </a:solidFill>
               </a:rPr>
-              <a:t>When in Rome, </a:t>
+              <a:t>in Rome, </a:t>
             </a:r>
             <a:br>
               <a:rPr lang="en" dirty="0">
@@ -10977,6 +13070,602 @@
         </p:spPr>
       </p:pic>
     </p:spTree>
+  </p:cSld>
+  <p:clrMapOvr>
+    <a:masterClrMapping/>
+  </p:clrMapOvr>
+  <p:transition xmlns:p14="http://schemas.microsoft.com/office/powerpoint/2010/main" spd="slow">
+    <p:cut/>
+  </p:transition>
+</p:sld>
+</file>
+
+<file path=ppt/slides/slide19.xml><?xml version="1.0" encoding="utf-8"?>
+<p:sld xmlns:a="http://schemas.openxmlformats.org/drawingml/2006/main" xmlns:r="http://schemas.openxmlformats.org/officeDocument/2006/relationships" xmlns:p="http://schemas.openxmlformats.org/presentationml/2006/main">
+  <p:cSld>
+    <p:spTree>
+      <p:nvGrpSpPr>
+        <p:cNvPr id="1" name="Shape 192"/>
+        <p:cNvGrpSpPr/>
+        <p:nvPr/>
+      </p:nvGrpSpPr>
+      <p:grpSpPr>
+        <a:xfrm>
+          <a:off x="0" y="0"/>
+          <a:ext cx="0" cy="0"/>
+          <a:chOff x="0" y="0"/>
+          <a:chExt cx="0" cy="0"/>
+        </a:xfrm>
+      </p:grpSpPr>
+      <p:sp>
+        <p:nvSpPr>
+          <p:cNvPr id="193" name="Shape 193"/>
+          <p:cNvSpPr txBox="1">
+            <a:spLocks noGrp="1"/>
+          </p:cNvSpPr>
+          <p:nvPr>
+            <p:ph type="title"/>
+          </p:nvPr>
+        </p:nvSpPr>
+        <p:spPr>
+          <a:xfrm>
+            <a:off x="457200" y="134800"/>
+            <a:ext cx="8183399" cy="1351799"/>
+          </a:xfrm>
+          <a:prstGeom prst="rect">
+            <a:avLst/>
+          </a:prstGeom>
+        </p:spPr>
+        <p:txBody>
+          <a:bodyPr lIns="91425" tIns="91425" rIns="91425" bIns="91425" anchor="b" anchorCtr="0">
+            <a:noAutofit/>
+          </a:bodyPr>
+          <a:lstStyle/>
+          <a:p>
+            <a:pPr lvl="0" rtl="0">
+              <a:buNone/>
+            </a:pPr>
+            <a:r>
+              <a:rPr lang="en-US" sz="3600" b="1" dirty="0" smtClean="0">
+                <a:solidFill>
+                  <a:srgbClr val="FFFFFF"/>
+                </a:solidFill>
+              </a:rPr>
+              <a:t>Resources</a:t>
+            </a:r>
+            <a:r>
+              <a:rPr lang="en" sz="3600" b="1" dirty="0" smtClean="0">
+                <a:solidFill>
+                  <a:srgbClr val="FFFFFF"/>
+                </a:solidFill>
+              </a:rPr>
+              <a:t>: </a:t>
+            </a:r>
+            <a:endParaRPr lang="en" sz="3600" b="1" dirty="0">
+              <a:solidFill>
+                <a:srgbClr val="FFFFFF"/>
+              </a:solidFill>
+            </a:endParaRPr>
+          </a:p>
+          <a:p>
+            <a:pPr lvl="0" rtl="0">
+              <a:buNone/>
+            </a:pPr>
+            <a:r>
+              <a:rPr lang="en-US" sz="3000" dirty="0" smtClean="0">
+                <a:solidFill>
+                  <a:srgbClr val="FFFFFF"/>
+                </a:solidFill>
+              </a:rPr>
+              <a:t>Continuous Learning</a:t>
+            </a:r>
+            <a:endParaRPr lang="en" sz="3000" dirty="0">
+              <a:solidFill>
+                <a:srgbClr val="FFFFFF"/>
+              </a:solidFill>
+            </a:endParaRPr>
+          </a:p>
+        </p:txBody>
+      </p:sp>
+      <p:sp>
+        <p:nvSpPr>
+          <p:cNvPr id="194" name="Shape 194"/>
+          <p:cNvSpPr txBox="1">
+            <a:spLocks noGrp="1"/>
+          </p:cNvSpPr>
+          <p:nvPr>
+            <p:ph type="body" idx="1"/>
+          </p:nvPr>
+        </p:nvSpPr>
+        <p:spPr>
+          <a:xfrm>
+            <a:off x="304800" y="1635125"/>
+            <a:ext cx="8686800" cy="5222875"/>
+          </a:xfrm>
+          <a:prstGeom prst="rect">
+            <a:avLst/>
+          </a:prstGeom>
+          <a:noFill/>
+        </p:spPr>
+        <p:txBody>
+          <a:bodyPr lIns="91425" tIns="91425" rIns="91425" bIns="91425" anchor="t" anchorCtr="0">
+            <a:noAutofit/>
+          </a:bodyPr>
+          <a:lstStyle/>
+          <a:p>
+            <a:r>
+              <a:rPr lang="en" dirty="0">
+                <a:solidFill>
+                  <a:schemeClr val="dk1"/>
+                </a:solidFill>
+              </a:rPr>
+              <a:t>Below is a list of resources used to prepare the materials for this course.</a:t>
+            </a:r>
+          </a:p>
+          <a:p>
+            <a:endParaRPr lang="en" sz="1200" dirty="0">
+              <a:solidFill>
+                <a:schemeClr val="dk1"/>
+              </a:solidFill>
+            </a:endParaRPr>
+          </a:p>
+          <a:p>
+            <a:r>
+              <a:rPr lang="en" sz="1400" dirty="0">
+                <a:solidFill>
+                  <a:schemeClr val="dk1"/>
+                </a:solidFill>
+              </a:rPr>
+              <a:t>Links</a:t>
+            </a:r>
+            <a:r>
+              <a:rPr lang="en" sz="1400" dirty="0" smtClean="0">
+                <a:solidFill>
+                  <a:schemeClr val="dk1"/>
+                </a:solidFill>
+              </a:rPr>
+              <a:t>:</a:t>
+            </a:r>
+            <a:endParaRPr lang="en" sz="1400" dirty="0">
+              <a:solidFill>
+                <a:schemeClr val="dk1"/>
+              </a:solidFill>
+            </a:endParaRPr>
+          </a:p>
+          <a:p>
+            <a:r>
+              <a:rPr lang="en" sz="1200" dirty="0">
+                <a:solidFill>
+                  <a:schemeClr val="dk1"/>
+                </a:solidFill>
+                <a:hlinkClick r:id="rId3"/>
+              </a:rPr>
+              <a:t>http://</a:t>
+            </a:r>
+            <a:r>
+              <a:rPr lang="en" sz="1200" dirty="0" smtClean="0">
+                <a:solidFill>
+                  <a:schemeClr val="dk1"/>
+                </a:solidFill>
+                <a:hlinkClick r:id="rId3"/>
+              </a:rPr>
+              <a:t>a-developer-life.blogspot.com/2011/12/mocks-stubs-expectations-fakes-stubs.html</a:t>
+            </a:r>
+            <a:endParaRPr lang="en" sz="1200" dirty="0">
+              <a:solidFill>
+                <a:schemeClr val="dk1"/>
+              </a:solidFill>
+            </a:endParaRPr>
+          </a:p>
+          <a:p>
+            <a:r>
+              <a:rPr lang="en" sz="1200" dirty="0">
+                <a:solidFill>
+                  <a:schemeClr val="dk1"/>
+                </a:solidFill>
+                <a:hlinkClick r:id="rId4"/>
+              </a:rPr>
+              <a:t>http://</a:t>
+            </a:r>
+            <a:r>
+              <a:rPr lang="en" sz="1200" dirty="0" smtClean="0">
+                <a:solidFill>
+                  <a:schemeClr val="dk1"/>
+                </a:solidFill>
+                <a:hlinkClick r:id="rId4"/>
+              </a:rPr>
+              <a:t>a-developer-life.blogspot.com/2011/06/jasmine-part-2-spies-and-mocks.html</a:t>
+            </a:r>
+            <a:endParaRPr lang="en" sz="1200" dirty="0">
+              <a:solidFill>
+                <a:schemeClr val="dk1"/>
+              </a:solidFill>
+            </a:endParaRPr>
+          </a:p>
+          <a:p>
+            <a:r>
+              <a:rPr lang="en" sz="1200" dirty="0">
+                <a:solidFill>
+                  <a:schemeClr val="dk1"/>
+                </a:solidFill>
+                <a:hlinkClick r:id="rId5"/>
+              </a:rPr>
+              <a:t>https://</a:t>
+            </a:r>
+            <a:r>
+              <a:rPr lang="en" sz="1200" dirty="0" smtClean="0">
+                <a:solidFill>
+                  <a:schemeClr val="dk1"/>
+                </a:solidFill>
+                <a:hlinkClick r:id="rId5"/>
+              </a:rPr>
+              <a:t>github.com/tcorral/Refactoring_Patterns</a:t>
+            </a:r>
+            <a:endParaRPr lang="en-US" sz="1200" dirty="0" smtClean="0">
+              <a:solidFill>
+                <a:schemeClr val="dk1"/>
+              </a:solidFill>
+            </a:endParaRPr>
+          </a:p>
+          <a:p>
+            <a:endParaRPr lang="en" sz="1200" dirty="0">
+              <a:solidFill>
+                <a:schemeClr val="dk1"/>
+              </a:solidFill>
+            </a:endParaRPr>
+          </a:p>
+          <a:p>
+            <a:r>
+              <a:rPr lang="en" sz="1400" dirty="0" smtClean="0">
+                <a:solidFill>
+                  <a:schemeClr val="dk1"/>
+                </a:solidFill>
+              </a:rPr>
+              <a:t>Jasmine</a:t>
+            </a:r>
+            <a:r>
+              <a:rPr lang="en-US" sz="1400" dirty="0" smtClean="0">
+                <a:solidFill>
+                  <a:schemeClr val="dk1"/>
+                </a:solidFill>
+              </a:rPr>
+              <a:t>:</a:t>
+            </a:r>
+            <a:endParaRPr lang="en" sz="1400" dirty="0">
+              <a:solidFill>
+                <a:schemeClr val="dk1"/>
+              </a:solidFill>
+            </a:endParaRPr>
+          </a:p>
+          <a:p>
+            <a:r>
+              <a:rPr lang="en" sz="1200" dirty="0">
+                <a:solidFill>
+                  <a:schemeClr val="dk1"/>
+                </a:solidFill>
+                <a:hlinkClick r:id="rId6"/>
+              </a:rPr>
+              <a:t>http://pivotal.github.io/jasmine</a:t>
+            </a:r>
+            <a:r>
+              <a:rPr lang="en" sz="1200" dirty="0" smtClean="0">
+                <a:solidFill>
+                  <a:schemeClr val="dk1"/>
+                </a:solidFill>
+                <a:hlinkClick r:id="rId6"/>
+              </a:rPr>
+              <a:t>/</a:t>
+            </a:r>
+            <a:endParaRPr lang="en" sz="1200" dirty="0">
+              <a:solidFill>
+                <a:schemeClr val="dk1"/>
+              </a:solidFill>
+            </a:endParaRPr>
+          </a:p>
+          <a:p>
+            <a:r>
+              <a:rPr lang="en" sz="1200" dirty="0">
+                <a:solidFill>
+                  <a:schemeClr val="dk1"/>
+                </a:solidFill>
+                <a:hlinkClick r:id="rId7"/>
+              </a:rPr>
+              <a:t>https://</a:t>
+            </a:r>
+            <a:r>
+              <a:rPr lang="en" sz="1200" dirty="0" smtClean="0">
+                <a:solidFill>
+                  <a:schemeClr val="dk1"/>
+                </a:solidFill>
+                <a:hlinkClick r:id="rId7"/>
+              </a:rPr>
+              <a:t>github.com/velesin/jasmine-jquery</a:t>
+            </a:r>
+            <a:endParaRPr lang="en" sz="1200" dirty="0">
+              <a:solidFill>
+                <a:schemeClr val="dk1"/>
+              </a:solidFill>
+            </a:endParaRPr>
+          </a:p>
+          <a:p>
+            <a:r>
+              <a:rPr lang="en" sz="1200" dirty="0">
+                <a:solidFill>
+                  <a:schemeClr val="dk1"/>
+                </a:solidFill>
+                <a:hlinkClick r:id="rId8"/>
+              </a:rPr>
+              <a:t>http://tobyho.com/2011/12/15/jasmine-spy-cheatsheet</a:t>
+            </a:r>
+            <a:r>
+              <a:rPr lang="en" sz="1200" dirty="0" smtClean="0">
+                <a:solidFill>
+                  <a:schemeClr val="dk1"/>
+                </a:solidFill>
+                <a:hlinkClick r:id="rId8"/>
+              </a:rPr>
+              <a:t>/</a:t>
+            </a:r>
+            <a:endParaRPr lang="en" sz="1200" dirty="0">
+              <a:solidFill>
+                <a:schemeClr val="dk1"/>
+              </a:solidFill>
+            </a:endParaRPr>
+          </a:p>
+          <a:p>
+            <a:r>
+              <a:rPr lang="en" sz="1200" dirty="0">
+                <a:solidFill>
+                  <a:schemeClr val="dk1"/>
+                </a:solidFill>
+                <a:hlinkClick r:id="rId9"/>
+              </a:rPr>
+              <a:t>http://tryjasmine.com</a:t>
+            </a:r>
+            <a:r>
+              <a:rPr lang="en" sz="1200" dirty="0" smtClean="0">
+                <a:solidFill>
+                  <a:schemeClr val="dk1"/>
+                </a:solidFill>
+                <a:hlinkClick r:id="rId9"/>
+              </a:rPr>
+              <a:t>/</a:t>
+            </a:r>
+            <a:endParaRPr lang="en" sz="1200" dirty="0">
+              <a:solidFill>
+                <a:schemeClr val="dk1"/>
+              </a:solidFill>
+            </a:endParaRPr>
+          </a:p>
+          <a:p>
+            <a:endParaRPr lang="en" sz="1200" dirty="0">
+              <a:solidFill>
+                <a:schemeClr val="dk1"/>
+              </a:solidFill>
+            </a:endParaRPr>
+          </a:p>
+          <a:p>
+            <a:r>
+              <a:rPr lang="en" sz="1400" dirty="0">
+                <a:solidFill>
+                  <a:schemeClr val="dk1"/>
+                </a:solidFill>
+              </a:rPr>
+              <a:t>Katas</a:t>
+            </a:r>
+            <a:r>
+              <a:rPr lang="en" sz="1400" dirty="0" smtClean="0">
+                <a:solidFill>
+                  <a:schemeClr val="dk1"/>
+                </a:solidFill>
+              </a:rPr>
+              <a:t>:</a:t>
+            </a:r>
+            <a:endParaRPr lang="en" sz="1400" dirty="0">
+              <a:solidFill>
+                <a:schemeClr val="dk1"/>
+              </a:solidFill>
+            </a:endParaRPr>
+          </a:p>
+          <a:p>
+            <a:r>
+              <a:rPr lang="en" sz="1200" dirty="0">
+                <a:solidFill>
+                  <a:schemeClr val="dk1"/>
+                </a:solidFill>
+                <a:hlinkClick r:id="rId10"/>
+              </a:rPr>
+              <a:t>http://www.peterprovost.org/blog/2012/05/02/kata-the-only-way-to-learn-tdd</a:t>
+            </a:r>
+            <a:endParaRPr lang="en" sz="1200" dirty="0">
+              <a:solidFill>
+                <a:schemeClr val="dk1"/>
+              </a:solidFill>
+            </a:endParaRPr>
+          </a:p>
+          <a:p>
+            <a:endParaRPr lang="en" sz="1200" dirty="0">
+              <a:solidFill>
+                <a:schemeClr val="dk1"/>
+              </a:solidFill>
+            </a:endParaRPr>
+          </a:p>
+          <a:p>
+            <a:r>
+              <a:rPr lang="en" sz="1200" dirty="0" smtClean="0">
+                <a:solidFill>
+                  <a:schemeClr val="dk1"/>
+                </a:solidFill>
+              </a:rPr>
+              <a:t>String Calculator</a:t>
+            </a:r>
+            <a:endParaRPr lang="en" sz="1200" dirty="0">
+              <a:solidFill>
+                <a:schemeClr val="dk1"/>
+              </a:solidFill>
+            </a:endParaRPr>
+          </a:p>
+          <a:p>
+            <a:r>
+              <a:rPr lang="en" sz="1200" dirty="0">
+                <a:solidFill>
+                  <a:schemeClr val="dk1"/>
+                </a:solidFill>
+                <a:hlinkClick r:id="rId11"/>
+              </a:rPr>
+              <a:t>http://anotherdave.wordpress.com/2010/01/13/calculator-tdd-kata-in-javascript</a:t>
+            </a:r>
+            <a:r>
+              <a:rPr lang="en" sz="1200" dirty="0" smtClean="0">
+                <a:solidFill>
+                  <a:schemeClr val="dk1"/>
+                </a:solidFill>
+                <a:hlinkClick r:id="rId11"/>
+              </a:rPr>
+              <a:t>/</a:t>
+            </a:r>
+            <a:endParaRPr lang="en-US" sz="1200" dirty="0" smtClean="0">
+              <a:solidFill>
+                <a:schemeClr val="dk1"/>
+              </a:solidFill>
+            </a:endParaRPr>
+          </a:p>
+          <a:p>
+            <a:r>
+              <a:rPr lang="en" sz="1200" dirty="0" smtClean="0">
+                <a:solidFill>
+                  <a:schemeClr val="dk1"/>
+                </a:solidFill>
+                <a:hlinkClick r:id="rId12"/>
+              </a:rPr>
+              <a:t>http</a:t>
+            </a:r>
+            <a:r>
+              <a:rPr lang="en" sz="1200" dirty="0">
+                <a:solidFill>
+                  <a:schemeClr val="dk1"/>
+                </a:solidFill>
+                <a:hlinkClick r:id="rId12"/>
+              </a:rPr>
+              <a:t>://</a:t>
+            </a:r>
+            <a:r>
+              <a:rPr lang="en" sz="1200" dirty="0" smtClean="0">
+                <a:solidFill>
+                  <a:schemeClr val="dk1"/>
+                </a:solidFill>
+                <a:hlinkClick r:id="rId12"/>
+              </a:rPr>
+              <a:t>vimeo.com/8708519</a:t>
+            </a:r>
+            <a:endParaRPr lang="en" sz="1200" dirty="0">
+              <a:solidFill>
+                <a:schemeClr val="dk1"/>
+              </a:solidFill>
+            </a:endParaRPr>
+          </a:p>
+          <a:p>
+            <a:endParaRPr lang="en" sz="1200" dirty="0">
+              <a:solidFill>
+                <a:schemeClr val="dk1"/>
+              </a:solidFill>
+            </a:endParaRPr>
+          </a:p>
+          <a:p>
+            <a:r>
+              <a:rPr lang="en" sz="1200" dirty="0">
+                <a:solidFill>
+                  <a:schemeClr val="dk1"/>
+                </a:solidFill>
+              </a:rPr>
+              <a:t>Roman </a:t>
+            </a:r>
+            <a:r>
+              <a:rPr lang="en" sz="1200" dirty="0" smtClean="0">
+                <a:solidFill>
+                  <a:schemeClr val="dk1"/>
+                </a:solidFill>
+              </a:rPr>
+              <a:t>Numerals</a:t>
+            </a:r>
+            <a:endParaRPr lang="en" sz="1200" dirty="0">
+              <a:solidFill>
+                <a:schemeClr val="dk1"/>
+              </a:solidFill>
+            </a:endParaRPr>
+          </a:p>
+          <a:p>
+            <a:r>
+              <a:rPr lang="en" sz="1200" dirty="0">
+                <a:solidFill>
+                  <a:schemeClr val="dk1"/>
+                </a:solidFill>
+                <a:hlinkClick r:id="rId13"/>
+              </a:rPr>
+              <a:t>http://</a:t>
+            </a:r>
+            <a:r>
+              <a:rPr lang="en" sz="1200" dirty="0" smtClean="0">
+                <a:solidFill>
+                  <a:schemeClr val="dk1"/>
+                </a:solidFill>
+                <a:hlinkClick r:id="rId13"/>
+              </a:rPr>
+              <a:t>codingdojo.org/cgi-bin/wiki.pl?KataRomanNumerals</a:t>
+            </a:r>
+            <a:endParaRPr lang="en-US" sz="1200" dirty="0" smtClean="0">
+              <a:solidFill>
+                <a:schemeClr val="dk1"/>
+              </a:solidFill>
+            </a:endParaRPr>
+          </a:p>
+          <a:p>
+            <a:r>
+              <a:rPr lang="en" sz="1200" dirty="0" smtClean="0">
+                <a:solidFill>
+                  <a:schemeClr val="dk1"/>
+                </a:solidFill>
+                <a:hlinkClick r:id="rId14"/>
+              </a:rPr>
+              <a:t>http</a:t>
+            </a:r>
+            <a:r>
+              <a:rPr lang="en" sz="1200" dirty="0">
+                <a:solidFill>
+                  <a:schemeClr val="dk1"/>
+                </a:solidFill>
+                <a:hlinkClick r:id="rId14"/>
+              </a:rPr>
+              <a:t>://youtu.be/BAavcCsCEpA</a:t>
+            </a:r>
+            <a:endParaRPr lang="en" sz="1200" dirty="0">
+              <a:solidFill>
+                <a:schemeClr val="dk1"/>
+              </a:solidFill>
+            </a:endParaRPr>
+          </a:p>
+          <a:p>
+            <a:endParaRPr lang="en" sz="1200" b="1" dirty="0">
+              <a:solidFill>
+                <a:srgbClr val="073763"/>
+              </a:solidFill>
+            </a:endParaRPr>
+          </a:p>
+          <a:p>
+            <a:endParaRPr lang="en" sz="1200" b="1" dirty="0">
+              <a:solidFill>
+                <a:srgbClr val="073763"/>
+              </a:solidFill>
+            </a:endParaRPr>
+          </a:p>
+        </p:txBody>
+      </p:sp>
+    </p:spTree>
+    <p:extLst>
+      <p:ext uri="{BB962C8B-B14F-4D97-AF65-F5344CB8AC3E}">
+        <p14:creationId xmlns:p14="http://schemas.microsoft.com/office/powerpoint/2010/main" val="3678587995"/>
+      </p:ext>
+    </p:extLst>
   </p:cSld>
   <p:clrMapOvr>
     <a:masterClrMapping/>
@@ -11033,13 +13722,313 @@
               <a:buNone/>
             </a:pPr>
             <a:r>
-              <a:rPr lang="en" sz="3600" b="1">
+              <a:rPr lang="en-US" sz="3600" b="1" dirty="0" smtClean="0">
                 <a:solidFill>
                   <a:srgbClr val="FFFFFF"/>
                 </a:solidFill>
               </a:rPr>
-              <a:t>First of All – Testing Basics</a:t>
-            </a:r>
+              <a:t>@Before:</a:t>
+            </a:r>
+            <a:br>
+              <a:rPr lang="en-US" sz="3600" b="1" dirty="0" smtClean="0">
+                <a:solidFill>
+                  <a:srgbClr val="FFFFFF"/>
+                </a:solidFill>
+              </a:rPr>
+            </a:br>
+            <a:r>
+              <a:rPr lang="en-US" sz="3600" b="1" dirty="0" smtClean="0">
+                <a:solidFill>
+                  <a:srgbClr val="FFFFFF"/>
+                </a:solidFill>
+              </a:rPr>
+              <a:t>  </a:t>
+            </a:r>
+            <a:r>
+              <a:rPr lang="en-US" sz="3000" dirty="0" smtClean="0">
+                <a:solidFill>
+                  <a:srgbClr val="FFFFFF"/>
+                </a:solidFill>
+              </a:rPr>
+              <a:t>Establish Goals</a:t>
+            </a:r>
+            <a:endParaRPr lang="en" sz="3000" dirty="0">
+              <a:solidFill>
+                <a:srgbClr val="FFFFFF"/>
+              </a:solidFill>
+            </a:endParaRPr>
+          </a:p>
+        </p:txBody>
+      </p:sp>
+      <p:sp>
+        <p:nvSpPr>
+          <p:cNvPr id="97" name="Shape 97"/>
+          <p:cNvSpPr txBox="1">
+            <a:spLocks noGrp="1"/>
+          </p:cNvSpPr>
+          <p:nvPr>
+            <p:ph type="body" idx="1"/>
+          </p:nvPr>
+        </p:nvSpPr>
+        <p:spPr>
+          <a:xfrm>
+            <a:off x="304800" y="2009488"/>
+            <a:ext cx="8229600" cy="4840199"/>
+          </a:xfrm>
+          <a:prstGeom prst="rect">
+            <a:avLst/>
+          </a:prstGeom>
+        </p:spPr>
+        <p:txBody>
+          <a:bodyPr lIns="91425" tIns="91425" rIns="91425" bIns="91425" anchor="t" anchorCtr="0">
+            <a:noAutofit/>
+          </a:bodyPr>
+          <a:lstStyle/>
+          <a:p>
+            <a:pPr marL="0" lvl="0" indent="0" rtl="0">
+              <a:lnSpc>
+                <a:spcPct val="115000"/>
+              </a:lnSpc>
+            </a:pPr>
+            <a:r>
+              <a:rPr lang="en-US" dirty="0" smtClean="0">
+                <a:solidFill>
+                  <a:srgbClr val="073763"/>
+                </a:solidFill>
+              </a:rPr>
+              <a:t>Basic Goals of This Talk</a:t>
+            </a:r>
+          </a:p>
+          <a:p>
+            <a:pPr marL="0" lvl="0" indent="0" rtl="0">
+              <a:lnSpc>
+                <a:spcPct val="115000"/>
+              </a:lnSpc>
+            </a:pPr>
+            <a:endParaRPr lang="en-US" dirty="0" smtClean="0">
+              <a:solidFill>
+                <a:srgbClr val="073763"/>
+              </a:solidFill>
+            </a:endParaRPr>
+          </a:p>
+          <a:p>
+            <a:pPr marL="285750" lvl="0" indent="-285750" rtl="0">
+              <a:lnSpc>
+                <a:spcPct val="115000"/>
+              </a:lnSpc>
+              <a:buFont typeface="Arial"/>
+              <a:buChar char="•"/>
+            </a:pPr>
+            <a:r>
+              <a:rPr lang="en-US" sz="1400" dirty="0" smtClean="0">
+                <a:solidFill>
+                  <a:srgbClr val="073763"/>
+                </a:solidFill>
+              </a:rPr>
+              <a:t>What is TDD?</a:t>
+            </a:r>
+            <a:endParaRPr lang="en-US" sz="1400" dirty="0">
+              <a:solidFill>
+                <a:srgbClr val="073763"/>
+              </a:solidFill>
+            </a:endParaRPr>
+          </a:p>
+          <a:p>
+            <a:pPr marL="285750" lvl="0" indent="-285750" rtl="0">
+              <a:lnSpc>
+                <a:spcPct val="115000"/>
+              </a:lnSpc>
+              <a:buFont typeface="Arial"/>
+              <a:buChar char="•"/>
+            </a:pPr>
+            <a:r>
+              <a:rPr lang="en-US" sz="1400" dirty="0" smtClean="0">
+                <a:solidFill>
+                  <a:srgbClr val="073763"/>
+                </a:solidFill>
+              </a:rPr>
+              <a:t>Why TDD?</a:t>
+            </a:r>
+            <a:endParaRPr lang="en-US" sz="1400" dirty="0">
+              <a:solidFill>
+                <a:srgbClr val="073763"/>
+              </a:solidFill>
+            </a:endParaRPr>
+          </a:p>
+          <a:p>
+            <a:pPr marL="285750" lvl="0" indent="-285750" rtl="0">
+              <a:lnSpc>
+                <a:spcPct val="115000"/>
+              </a:lnSpc>
+              <a:buFont typeface="Arial"/>
+              <a:buChar char="•"/>
+            </a:pPr>
+            <a:r>
+              <a:rPr lang="en-US" sz="1400" dirty="0" smtClean="0">
+                <a:solidFill>
+                  <a:srgbClr val="073763"/>
+                </a:solidFill>
+              </a:rPr>
+              <a:t>How to TDD?</a:t>
+            </a:r>
+          </a:p>
+          <a:p>
+            <a:pPr marL="285750" lvl="0" indent="-285750" rtl="0">
+              <a:lnSpc>
+                <a:spcPct val="115000"/>
+              </a:lnSpc>
+              <a:buFont typeface="Arial"/>
+              <a:buChar char="•"/>
+            </a:pPr>
+            <a:r>
+              <a:rPr lang="en-US" sz="1400" dirty="0" smtClean="0">
+                <a:solidFill>
+                  <a:srgbClr val="073763"/>
+                </a:solidFill>
+              </a:rPr>
+              <a:t>Have some fun!</a:t>
+            </a:r>
+          </a:p>
+        </p:txBody>
+      </p:sp>
+      <p:pic>
+        <p:nvPicPr>
+          <p:cNvPr id="2" name="Picture 1" descr="Goal_Setting.jpg"/>
+          <p:cNvPicPr>
+            <a:picLocks noChangeAspect="1"/>
+          </p:cNvPicPr>
+          <p:nvPr/>
+        </p:nvPicPr>
+        <p:blipFill>
+          <a:blip r:embed="rId3">
+            <a:extLst>
+              <a:ext uri="{28A0092B-C50C-407E-A947-70E740481C1C}">
+                <a14:useLocalDpi xmlns:a14="http://schemas.microsoft.com/office/drawing/2010/main" val="0"/>
+              </a:ext>
+            </a:extLst>
+          </a:blip>
+          <a:stretch>
+            <a:fillRect/>
+          </a:stretch>
+        </p:blipFill>
+        <p:spPr>
+          <a:xfrm>
+            <a:off x="2841625" y="2580988"/>
+            <a:ext cx="6123341" cy="4023035"/>
+          </a:xfrm>
+          <a:prstGeom prst="rect">
+            <a:avLst/>
+          </a:prstGeom>
+        </p:spPr>
+      </p:pic>
+    </p:spTree>
+  </p:cSld>
+  <p:clrMapOvr>
+    <a:masterClrMapping/>
+  </p:clrMapOvr>
+  <p:transition xmlns:p14="http://schemas.microsoft.com/office/powerpoint/2010/main" spd="slow">
+    <p:cut/>
+  </p:transition>
+</p:sld>
+</file>
+
+<file path=ppt/slides/slide3.xml><?xml version="1.0" encoding="utf-8"?>
+<p:sld xmlns:a="http://schemas.openxmlformats.org/drawingml/2006/main" xmlns:r="http://schemas.openxmlformats.org/officeDocument/2006/relationships" xmlns:p="http://schemas.openxmlformats.org/presentationml/2006/main">
+  <p:cSld>
+    <p:spTree>
+      <p:nvGrpSpPr>
+        <p:cNvPr id="1" name="Shape 94"/>
+        <p:cNvGrpSpPr/>
+        <p:nvPr/>
+      </p:nvGrpSpPr>
+      <p:grpSpPr>
+        <a:xfrm>
+          <a:off x="0" y="0"/>
+          <a:ext cx="0" cy="0"/>
+          <a:chOff x="0" y="0"/>
+          <a:chExt cx="0" cy="0"/>
+        </a:xfrm>
+      </p:grpSpPr>
+      <p:sp>
+        <p:nvSpPr>
+          <p:cNvPr id="95" name="Shape 95"/>
+          <p:cNvSpPr txBox="1">
+            <a:spLocks noGrp="1"/>
+          </p:cNvSpPr>
+          <p:nvPr>
+            <p:ph type="title"/>
+          </p:nvPr>
+        </p:nvSpPr>
+        <p:spPr>
+          <a:xfrm>
+            <a:off x="457200" y="134801"/>
+            <a:ext cx="7315499" cy="1351799"/>
+          </a:xfrm>
+          <a:prstGeom prst="rect">
+            <a:avLst/>
+          </a:prstGeom>
+        </p:spPr>
+        <p:txBody>
+          <a:bodyPr lIns="91425" tIns="91425" rIns="91425" bIns="91425" anchor="b" anchorCtr="0">
+            <a:noAutofit/>
+          </a:bodyPr>
+          <a:lstStyle/>
+          <a:p>
+            <a:pPr>
+              <a:buNone/>
+            </a:pPr>
+            <a:r>
+              <a:rPr lang="en" sz="3600" b="1" dirty="0">
+                <a:solidFill>
+                  <a:srgbClr val="FFFFFF"/>
+                </a:solidFill>
+              </a:rPr>
+              <a:t>First of All – Testing </a:t>
+            </a:r>
+            <a:r>
+              <a:rPr lang="en" sz="3600" b="1" dirty="0" smtClean="0">
+                <a:solidFill>
+                  <a:srgbClr val="FFFFFF"/>
+                </a:solidFill>
+              </a:rPr>
+              <a:t>Basics</a:t>
+            </a:r>
+            <a:r>
+              <a:rPr lang="en-US" sz="3600" b="1" dirty="0" smtClean="0">
+                <a:solidFill>
+                  <a:srgbClr val="FFFFFF"/>
+                </a:solidFill>
+              </a:rPr>
+              <a:t>:</a:t>
+            </a:r>
+            <a:br>
+              <a:rPr lang="en-US" sz="3600" b="1" dirty="0" smtClean="0">
+                <a:solidFill>
+                  <a:srgbClr val="FFFFFF"/>
+                </a:solidFill>
+              </a:rPr>
+            </a:br>
+            <a:r>
+              <a:rPr lang="en-US" sz="3600" b="1" dirty="0" smtClean="0">
+                <a:solidFill>
+                  <a:srgbClr val="FFFFFF"/>
+                </a:solidFill>
+              </a:rPr>
+              <a:t>  </a:t>
+            </a:r>
+            <a:r>
+              <a:rPr lang="en-US" sz="3200" dirty="0" smtClean="0">
+                <a:solidFill>
+                  <a:srgbClr val="FFFFFF"/>
+                </a:solidFill>
+              </a:rPr>
+              <a:t>What We Do Now</a:t>
+            </a:r>
+            <a:endParaRPr lang="en" sz="3200" dirty="0">
+              <a:solidFill>
+                <a:srgbClr val="FFFFFF"/>
+              </a:solidFill>
+            </a:endParaRPr>
           </a:p>
         </p:txBody>
       </p:sp>
@@ -11382,6 +14371,11 @@
         </p:txBody>
       </p:sp>
     </p:spTree>
+    <p:extLst>
+      <p:ext uri="{BB962C8B-B14F-4D97-AF65-F5344CB8AC3E}">
+        <p14:creationId xmlns:p14="http://schemas.microsoft.com/office/powerpoint/2010/main" val="2690785045"/>
+      </p:ext>
+    </p:extLst>
   </p:cSld>
   <p:clrMapOvr>
     <a:masterClrMapping/>
@@ -11392,7 +14386,7 @@
 </p:sld>
 </file>
 
-<file path=ppt/slides/slide3.xml><?xml version="1.0" encoding="utf-8"?>
+<file path=ppt/slides/slide4.xml><?xml version="1.0" encoding="utf-8"?>
 <p:sld xmlns:a="http://schemas.openxmlformats.org/drawingml/2006/main" xmlns:r="http://schemas.openxmlformats.org/officeDocument/2006/relationships" xmlns:p="http://schemas.openxmlformats.org/presentationml/2006/main">
   <p:cSld>
     <p:spTree>
@@ -11776,7 +14770,7 @@
 </p:sld>
 </file>
 
-<file path=ppt/slides/slide4.xml><?xml version="1.0" encoding="utf-8"?>
+<file path=ppt/slides/slide5.xml><?xml version="1.0" encoding="utf-8"?>
 <p:sld xmlns:a="http://schemas.openxmlformats.org/drawingml/2006/main" xmlns:r="http://schemas.openxmlformats.org/officeDocument/2006/relationships" xmlns:p="http://schemas.openxmlformats.org/presentationml/2006/main">
   <p:cSld>
     <p:spTree>
@@ -12121,7 +15115,7 @@
 </p:sld>
 </file>
 
-<file path=ppt/slides/slide5.xml><?xml version="1.0" encoding="utf-8"?>
+<file path=ppt/slides/slide6.xml><?xml version="1.0" encoding="utf-8"?>
 <p:sld xmlns:a="http://schemas.openxmlformats.org/drawingml/2006/main" xmlns:r="http://schemas.openxmlformats.org/officeDocument/2006/relationships" xmlns:p="http://schemas.openxmlformats.org/presentationml/2006/main">
   <p:cSld>
     <p:spTree>
@@ -12572,7 +15566,7 @@
 </p:sld>
 </file>
 
-<file path=ppt/slides/slide6.xml><?xml version="1.0" encoding="utf-8"?>
+<file path=ppt/slides/slide7.xml><?xml version="1.0" encoding="utf-8"?>
 <p:sld xmlns:a="http://schemas.openxmlformats.org/drawingml/2006/main" xmlns:r="http://schemas.openxmlformats.org/officeDocument/2006/relationships" xmlns:p="http://schemas.openxmlformats.org/presentationml/2006/main">
   <p:cSld>
     <p:spTree>
@@ -12692,7 +15686,7 @@
         </p:nvSpPr>
         <p:spPr>
           <a:xfrm>
-            <a:off x="152400" y="1704688"/>
+            <a:off x="152400" y="1768188"/>
             <a:ext cx="8229600" cy="5025472"/>
           </a:xfrm>
           <a:prstGeom prst="rect">
@@ -13095,35 +16089,6 @@
             </a:endParaRPr>
           </a:p>
           <a:p>
-            <a:pPr lvl="0" rtl="0">
-              <a:lnSpc>
-                <a:spcPct val="115000"/>
-              </a:lnSpc>
-              <a:buNone/>
-            </a:pPr>
-            <a:r>
-              <a:rPr lang="en" sz="1400" dirty="0">
-                <a:solidFill>
-                  <a:srgbClr val="073763"/>
-                </a:solidFill>
-              </a:rPr>
-              <a:t>Tests become harder and harder to write the more tightly coupled the different parts of the system are. As explained by Tate and Gehtland (2004), the best defense against high system coupling is writing tests</a:t>
-            </a:r>
-            <a:r>
-              <a:rPr lang="en" sz="1400" dirty="0" smtClean="0">
-                <a:solidFill>
-                  <a:srgbClr val="073763"/>
-                </a:solidFill>
-              </a:rPr>
-              <a:t>.</a:t>
-            </a:r>
-            <a:endParaRPr lang="en-US" sz="1400" dirty="0" smtClean="0">
-              <a:solidFill>
-                <a:srgbClr val="073763"/>
-              </a:solidFill>
-            </a:endParaRPr>
-          </a:p>
-          <a:p>
             <a:pPr marL="0" indent="0" defTabSz="457200">
               <a:buClrTx/>
               <a:buSzTx/>
@@ -13142,7 +16107,7 @@
               <a:defRPr/>
             </a:pPr>
             <a:r>
-              <a:rPr lang="en-US" sz="1000" kern="1200" dirty="0" smtClean="0">
+              <a:rPr lang="en-US" sz="1400" i="1" kern="1200" dirty="0" smtClean="0">
                 <a:solidFill>
                   <a:schemeClr val="bg2"/>
                 </a:solidFill>
@@ -13150,14 +16115,14 @@
               <a:t>*Rod Hilton, Quantitatively </a:t>
             </a:r>
             <a:r>
-              <a:rPr lang="en-US" sz="1000" kern="1200" dirty="0">
+              <a:rPr lang="en-US" sz="1400" i="1" kern="1200" dirty="0">
                 <a:solidFill>
                   <a:schemeClr val="bg2"/>
                 </a:solidFill>
               </a:rPr>
               <a:t>Evaluating Test-Driven Development by Applying Object-Oriented Quality Metrics to Open Source Projects</a:t>
             </a:r>
-            <a:endParaRPr lang="en" sz="1000" dirty="0">
+            <a:endParaRPr lang="en" sz="1400" i="1" dirty="0">
               <a:solidFill>
                 <a:schemeClr val="bg2"/>
               </a:solidFill>
@@ -13190,7 +16155,7 @@
 </p:sld>
 </file>
 
-<file path=ppt/slides/slide7.xml><?xml version="1.0" encoding="utf-8"?>
+<file path=ppt/slides/slide8.xml><?xml version="1.0" encoding="utf-8"?>
 <p:sld xmlns:a="http://schemas.openxmlformats.org/drawingml/2006/main" xmlns:r="http://schemas.openxmlformats.org/officeDocument/2006/relationships" xmlns:p="http://schemas.openxmlformats.org/presentationml/2006/main">
   <p:cSld>
     <p:spTree>
@@ -13413,7 +16378,7 @@
 </p:sld>
 </file>
 
-<file path=ppt/slides/slide8.xml><?xml version="1.0" encoding="utf-8"?>
+<file path=ppt/slides/slide9.xml><?xml version="1.0" encoding="utf-8"?>
 <p:sld xmlns:a="http://schemas.openxmlformats.org/drawingml/2006/main" xmlns:r="http://schemas.openxmlformats.org/officeDocument/2006/relationships" xmlns:p="http://schemas.openxmlformats.org/presentationml/2006/main">
   <p:cSld>
     <p:spTree>
@@ -13559,173 +16524,6 @@
           <a:xfrm>
             <a:off x="1086575" y="2283125"/>
             <a:ext cx="7009498" cy="4261775"/>
-          </a:xfrm>
-          <a:prstGeom prst="rect">
-            <a:avLst/>
-          </a:prstGeom>
-          <a:noFill/>
-          <a:ln>
-            <a:noFill/>
-          </a:ln>
-        </p:spPr>
-      </p:pic>
-    </p:spTree>
-  </p:cSld>
-  <p:clrMapOvr>
-    <a:masterClrMapping/>
-  </p:clrMapOvr>
-  <p:transition xmlns:p14="http://schemas.microsoft.com/office/powerpoint/2010/main" spd="slow">
-    <p:cut/>
-  </p:transition>
-</p:sld>
-</file>
-
-<file path=ppt/slides/slide9.xml><?xml version="1.0" encoding="utf-8"?>
-<p:sld xmlns:a="http://schemas.openxmlformats.org/drawingml/2006/main" xmlns:r="http://schemas.openxmlformats.org/officeDocument/2006/relationships" xmlns:p="http://schemas.openxmlformats.org/presentationml/2006/main">
-  <p:cSld>
-    <p:spTree>
-      <p:nvGrpSpPr>
-        <p:cNvPr id="1" name="Shape 143"/>
-        <p:cNvGrpSpPr/>
-        <p:nvPr/>
-      </p:nvGrpSpPr>
-      <p:grpSpPr>
-        <a:xfrm>
-          <a:off x="0" y="0"/>
-          <a:ext cx="0" cy="0"/>
-          <a:chOff x="0" y="0"/>
-          <a:chExt cx="0" cy="0"/>
-        </a:xfrm>
-      </p:grpSpPr>
-      <p:sp>
-        <p:nvSpPr>
-          <p:cNvPr id="144" name="Shape 144"/>
-          <p:cNvSpPr txBox="1">
-            <a:spLocks noGrp="1"/>
-          </p:cNvSpPr>
-          <p:nvPr>
-            <p:ph type="title"/>
-          </p:nvPr>
-        </p:nvSpPr>
-        <p:spPr>
-          <a:xfrm>
-            <a:off x="457200" y="134800"/>
-            <a:ext cx="8128799" cy="1351799"/>
-          </a:xfrm>
-          <a:prstGeom prst="rect">
-            <a:avLst/>
-          </a:prstGeom>
-        </p:spPr>
-        <p:txBody>
-          <a:bodyPr lIns="91425" tIns="91425" rIns="91425" bIns="91425" anchor="b" anchorCtr="0">
-            <a:noAutofit/>
-          </a:bodyPr>
-          <a:lstStyle/>
-          <a:p>
-            <a:pPr lvl="0" rtl="0">
-              <a:buNone/>
-            </a:pPr>
-            <a:r>
-              <a:rPr lang="en" sz="3600" b="1">
-                <a:solidFill>
-                  <a:srgbClr val="FFFFFF"/>
-                </a:solidFill>
-              </a:rPr>
-              <a:t>Secondly – Now for some action:</a:t>
-            </a:r>
-            <a:r>
-              <a:rPr lang="en" sz="1000">
-                <a:solidFill>
-                  <a:schemeClr val="dk1"/>
-                </a:solidFill>
-              </a:rPr>
-              <a:t>T</a:t>
-            </a:r>
-          </a:p>
-          <a:p>
-            <a:pPr lvl="0" rtl="0">
-              <a:buNone/>
-            </a:pPr>
-            <a:r>
-              <a:rPr lang="en" sz="3000">
-                <a:solidFill>
-                  <a:srgbClr val="FFFFFF"/>
-                </a:solidFill>
-              </a:rPr>
-              <a:t>Test First (Test Driven) vs. Test After</a:t>
-            </a:r>
-          </a:p>
-        </p:txBody>
-      </p:sp>
-      <p:sp>
-        <p:nvSpPr>
-          <p:cNvPr id="145" name="Shape 145"/>
-          <p:cNvSpPr txBox="1">
-            <a:spLocks noGrp="1"/>
-          </p:cNvSpPr>
-          <p:nvPr>
-            <p:ph type="body" idx="1"/>
-          </p:nvPr>
-        </p:nvSpPr>
-        <p:spPr>
-          <a:xfrm>
-            <a:off x="152400" y="1704688"/>
-            <a:ext cx="8229600" cy="4840199"/>
-          </a:xfrm>
-          <a:prstGeom prst="rect">
-            <a:avLst/>
-          </a:prstGeom>
-        </p:spPr>
-        <p:txBody>
-          <a:bodyPr lIns="91425" tIns="91425" rIns="91425" bIns="91425" anchor="t" anchorCtr="0">
-            <a:noAutofit/>
-          </a:bodyPr>
-          <a:lstStyle/>
-          <a:p>
-            <a:pPr lvl="0" rtl="0">
-              <a:buNone/>
-            </a:pPr>
-            <a:r>
-              <a:rPr lang="en">
-                <a:solidFill>
-                  <a:srgbClr val="073763"/>
-                </a:solidFill>
-              </a:rPr>
-              <a:t>Code Coverage Example</a:t>
-            </a:r>
-          </a:p>
-          <a:p>
-            <a:endParaRPr lang="en">
-              <a:solidFill>
-                <a:srgbClr val="073763"/>
-              </a:solidFill>
-            </a:endParaRPr>
-          </a:p>
-          <a:p>
-            <a:endParaRPr lang="en">
-              <a:solidFill>
-                <a:srgbClr val="073763"/>
-              </a:solidFill>
-            </a:endParaRPr>
-          </a:p>
-        </p:txBody>
-      </p:sp>
-      <p:pic>
-        <p:nvPicPr>
-          <p:cNvPr id="146" name="Shape 146"/>
-          <p:cNvPicPr preferRelativeResize="0"/>
-          <p:nvPr/>
-        </p:nvPicPr>
-        <p:blipFill>
-          <a:blip r:embed="rId3"/>
-          <a:stretch>
-            <a:fillRect/>
-          </a:stretch>
-        </p:blipFill>
-        <p:spPr>
-          <a:xfrm>
-            <a:off x="1021425" y="2274650"/>
-            <a:ext cx="7107374" cy="4307049"/>
           </a:xfrm>
           <a:prstGeom prst="rect">
             <a:avLst/>

</xml_diff>

<commit_message>
Added github link to deck
</commit_message>
<xml_diff>
--- a/Learning to Test Drive_ A Crash Course in Test Driven Development.pptx
+++ b/Learning to Test Drive_ A Crash Course in Test Driven Development.pptx
@@ -11969,8 +11969,61 @@
                   <a:srgbClr val="073763"/>
                 </a:solidFill>
               </a:rPr>
-              <a:t>Your Laptop!</a:t>
-            </a:r>
+              <a:t>Your Laptop</a:t>
+            </a:r>
+            <a:r>
+              <a:rPr lang="en-US" dirty="0" smtClean="0">
+                <a:solidFill>
+                  <a:srgbClr val="073763"/>
+                </a:solidFill>
+              </a:rPr>
+              <a:t>!</a:t>
+            </a:r>
+          </a:p>
+          <a:p>
+            <a:pPr marL="0" lvl="0" indent="0" rtl="0">
+              <a:lnSpc>
+                <a:spcPct val="115000"/>
+              </a:lnSpc>
+              <a:buNone/>
+            </a:pPr>
+            <a:endParaRPr lang="en-US" dirty="0">
+              <a:solidFill>
+                <a:srgbClr val="073763"/>
+              </a:solidFill>
+            </a:endParaRPr>
+          </a:p>
+          <a:p>
+            <a:pPr marL="0" lvl="0" indent="0">
+              <a:lnSpc>
+                <a:spcPct val="115000"/>
+              </a:lnSpc>
+            </a:pPr>
+            <a:r>
+              <a:rPr lang="en-US" sz="1200" dirty="0">
+                <a:solidFill>
+                  <a:srgbClr val="073763"/>
+                </a:solidFill>
+                <a:hlinkClick r:id="rId3"/>
+              </a:rPr>
+              <a:t>https://github.com/bink627/Agile-and-Beyond-</a:t>
+            </a:r>
+            <a:r>
+              <a:rPr lang="en-US" sz="1200" dirty="0" smtClean="0">
+                <a:solidFill>
+                  <a:srgbClr val="073763"/>
+                </a:solidFill>
+                <a:hlinkClick r:id="rId3"/>
+              </a:rPr>
+              <a:t>TDD</a:t>
+            </a:r>
+            <a:endParaRPr lang="en-US" sz="1200" dirty="0" smtClean="0">
+              <a:solidFill>
+                <a:srgbClr val="073763"/>
+              </a:solidFill>
+            </a:endParaRPr>
+          </a:p>
+          <a:p>
             <a:endParaRPr lang="en" dirty="0">
               <a:solidFill>
                 <a:srgbClr val="073763"/>
@@ -11978,7 +12031,13 @@
             </a:endParaRPr>
           </a:p>
           <a:p>
-            <a:endParaRPr lang="en" dirty="0">
+            <a:pPr marL="0" lvl="0" indent="0" rtl="0">
+              <a:lnSpc>
+                <a:spcPct val="115000"/>
+              </a:lnSpc>
+              <a:buNone/>
+            </a:pPr>
+            <a:endParaRPr lang="en-US" sz="1400" dirty="0" smtClean="0">
               <a:solidFill>
                 <a:srgbClr val="073763"/>
               </a:solidFill>
@@ -11992,12 +12051,20 @@
               <a:buNone/>
             </a:pPr>
             <a:r>
+              <a:rPr lang="en" sz="1400" dirty="0" smtClean="0">
+                <a:solidFill>
+                  <a:srgbClr val="073763"/>
+                </a:solidFill>
+              </a:rPr>
+              <a:t>Let’s </a:t>
+            </a:r>
+            <a:r>
               <a:rPr lang="en" sz="1400" dirty="0">
                 <a:solidFill>
                   <a:srgbClr val="073763"/>
                 </a:solidFill>
               </a:rPr>
-              <a:t>Let’s work through the </a:t>
+              <a:t>work through the </a:t>
             </a:r>
           </a:p>
           <a:p>
@@ -12015,162 +12082,6 @@
               </a:rPr>
               <a:t>String Calculator Kata</a:t>
             </a:r>
-          </a:p>
-          <a:p>
-            <a:endParaRPr lang="en" sz="1400" b="1" dirty="0">
-              <a:solidFill>
-                <a:srgbClr val="073763"/>
-              </a:solidFill>
-            </a:endParaRPr>
-          </a:p>
-          <a:p>
-            <a:pPr lvl="0" rtl="0">
-              <a:lnSpc>
-                <a:spcPct val="126000"/>
-              </a:lnSpc>
-              <a:spcAft>
-                <a:spcPts val="1100"/>
-              </a:spcAft>
-              <a:buNone/>
-            </a:pPr>
-            <a:r>
-              <a:rPr lang="en" sz="1400" dirty="0">
-                <a:solidFill>
-                  <a:srgbClr val="073763"/>
-                </a:solidFill>
-              </a:rPr>
-              <a:t>The following is a TDD </a:t>
-            </a:r>
-            <a:r>
-              <a:rPr lang="en" sz="1400" dirty="0" smtClean="0">
-                <a:solidFill>
-                  <a:srgbClr val="073763"/>
-                </a:solidFill>
-              </a:rPr>
-              <a:t>Kata</a:t>
-            </a:r>
-            <a:r>
-              <a:rPr lang="en-US" sz="1400" dirty="0">
-                <a:solidFill>
-                  <a:srgbClr val="073763"/>
-                </a:solidFill>
-              </a:rPr>
-              <a:t> </a:t>
-            </a:r>
-            <a:r>
-              <a:rPr lang="en" sz="1400" dirty="0" smtClean="0">
-                <a:solidFill>
-                  <a:srgbClr val="073763"/>
-                </a:solidFill>
-              </a:rPr>
-              <a:t>an </a:t>
-            </a:r>
-            <a:r>
-              <a:rPr lang="en" sz="1400" dirty="0">
-                <a:solidFill>
-                  <a:srgbClr val="073763"/>
-                </a:solidFill>
-              </a:rPr>
-              <a:t>exercise </a:t>
-            </a:r>
-            <a:r>
-              <a:rPr lang="en-US" sz="1400" dirty="0">
-                <a:solidFill>
-                  <a:srgbClr val="073763"/>
-                </a:solidFill>
-              </a:rPr>
-              <a:t/>
-            </a:r>
-            <a:br>
-              <a:rPr lang="en-US" sz="1400" dirty="0">
-                <a:solidFill>
-                  <a:srgbClr val="073763"/>
-                </a:solidFill>
-              </a:rPr>
-            </a:br>
-            <a:r>
-              <a:rPr lang="en" sz="1400" dirty="0" smtClean="0">
-                <a:solidFill>
-                  <a:srgbClr val="073763"/>
-                </a:solidFill>
-              </a:rPr>
-              <a:t>in </a:t>
-            </a:r>
-            <a:r>
-              <a:rPr lang="en" sz="1400" dirty="0">
-                <a:solidFill>
-                  <a:srgbClr val="073763"/>
-                </a:solidFill>
-              </a:rPr>
-              <a:t>coding, refactoring and </a:t>
-            </a:r>
-            <a:r>
-              <a:rPr lang="en" sz="1400" dirty="0" smtClean="0">
-                <a:solidFill>
-                  <a:srgbClr val="073763"/>
-                </a:solidFill>
-              </a:rPr>
-              <a:t>test-first</a:t>
-            </a:r>
-            <a:r>
-              <a:rPr lang="en" sz="1400" dirty="0">
-                <a:solidFill>
-                  <a:srgbClr val="073763"/>
-                </a:solidFill>
-              </a:rPr>
-              <a:t>, </a:t>
-            </a:r>
-            <a:r>
-              <a:rPr lang="en-US" sz="1400" dirty="0" smtClean="0">
-                <a:solidFill>
-                  <a:srgbClr val="073763"/>
-                </a:solidFill>
-              </a:rPr>
-              <a:t/>
-            </a:r>
-            <a:br>
-              <a:rPr lang="en-US" sz="1400" dirty="0" smtClean="0">
-                <a:solidFill>
-                  <a:srgbClr val="073763"/>
-                </a:solidFill>
-              </a:rPr>
-            </a:br>
-            <a:r>
-              <a:rPr lang="en" sz="1400" dirty="0" smtClean="0">
-                <a:solidFill>
-                  <a:srgbClr val="073763"/>
-                </a:solidFill>
-              </a:rPr>
-              <a:t>that </a:t>
-            </a:r>
-            <a:r>
-              <a:rPr lang="en" sz="1400" dirty="0">
-                <a:solidFill>
-                  <a:srgbClr val="073763"/>
-                </a:solidFill>
-              </a:rPr>
-              <a:t>you should </a:t>
-            </a:r>
-            <a:r>
-              <a:rPr lang="en" sz="1400" dirty="0" smtClean="0">
-                <a:solidFill>
-                  <a:srgbClr val="073763"/>
-                </a:solidFill>
-              </a:rPr>
-              <a:t>apply.</a:t>
-            </a:r>
-            <a:endParaRPr lang="en" sz="1400" dirty="0">
-              <a:solidFill>
-                <a:srgbClr val="073763"/>
-              </a:solidFill>
-            </a:endParaRPr>
-          </a:p>
-          <a:p>
-            <a:endParaRPr lang="en" sz="1400" dirty="0">
-              <a:solidFill>
-                <a:srgbClr val="073763"/>
-              </a:solidFill>
-            </a:endParaRPr>
           </a:p>
           <a:p>
             <a:pPr lvl="0" rtl="0">
@@ -12202,8 +12113,26 @@
               <a:buFont typeface="Arial"/>
               <a:buNone/>
             </a:pPr>
-            <a:r>
-              <a:rPr lang="en" sz="1400" dirty="0" smtClean="0">
+            <a:endParaRPr lang="en-US" sz="1400" dirty="0">
+              <a:solidFill>
+                <a:srgbClr val="073763"/>
+              </a:solidFill>
+            </a:endParaRPr>
+          </a:p>
+          <a:p>
+            <a:pPr lvl="0" rtl="0">
+              <a:spcAft>
+                <a:spcPts val="800"/>
+              </a:spcAft>
+              <a:buClr>
+                <a:schemeClr val="dk1"/>
+              </a:buClr>
+              <a:buSzPct val="78571"/>
+              <a:buFont typeface="Arial"/>
+              <a:buNone/>
+            </a:pPr>
+            <a:r>
+              <a:rPr lang="en" dirty="0" smtClean="0">
                 <a:solidFill>
                   <a:srgbClr val="073763"/>
                 </a:solidFill>
@@ -12211,7 +12140,7 @@
               <a:t>Before </a:t>
             </a:r>
             <a:r>
-              <a:rPr lang="en" sz="1400" dirty="0">
+              <a:rPr lang="en" dirty="0">
                 <a:solidFill>
                   <a:srgbClr val="073763"/>
                 </a:solidFill>
@@ -12372,7 +12301,7 @@
                 <a:solidFill>
                   <a:srgbClr val="073763"/>
                 </a:solidFill>
-                <a:hlinkClick r:id="rId3"/>
+                <a:hlinkClick r:id="rId4"/>
               </a:rPr>
               <a:t>http</a:t>
             </a:r>
@@ -12381,7 +12310,7 @@
                 <a:solidFill>
                   <a:srgbClr val="073763"/>
                 </a:solidFill>
-                <a:hlinkClick r:id="rId3"/>
+                <a:hlinkClick r:id="rId4"/>
               </a:rPr>
               <a:t>://vimeo.com/</a:t>
             </a:r>
@@ -12390,7 +12319,7 @@
                 <a:solidFill>
                   <a:srgbClr val="073763"/>
                 </a:solidFill>
-                <a:hlinkClick r:id="rId3"/>
+                <a:hlinkClick r:id="rId4"/>
               </a:rPr>
               <a:t>8722480</a:t>
             </a:r>
@@ -12416,14 +12345,14 @@
           <p:nvPr/>
         </p:nvPicPr>
         <p:blipFill>
-          <a:blip r:embed="rId4"/>
+          <a:blip r:embed="rId5"/>
           <a:stretch>
             <a:fillRect/>
           </a:stretch>
         </p:blipFill>
         <p:spPr>
           <a:xfrm>
-            <a:off x="4149300" y="2135050"/>
+            <a:off x="4197531" y="2102900"/>
             <a:ext cx="4405224" cy="2977800"/>
           </a:xfrm>
           <a:prstGeom prst="rect">
@@ -12536,15 +12465,7 @@
                   <a:srgbClr val="FFFFFF"/>
                 </a:solidFill>
               </a:rPr>
-              <a:t>String </a:t>
-            </a:r>
-            <a:r>
-              <a:rPr lang="en-US" sz="3000" dirty="0" smtClean="0">
-                <a:solidFill>
-                  <a:srgbClr val="FFFFFF"/>
-                </a:solidFill>
-              </a:rPr>
-              <a:t>Calculator Kata</a:t>
+              <a:t>String Calculator Kata</a:t>
             </a:r>
             <a:endParaRPr lang="en" sz="3000" dirty="0">
               <a:solidFill>
@@ -13836,15 +13757,7 @@
                   <a:srgbClr val="FFFFFF"/>
                 </a:solidFill>
               </a:rPr>
-              <a:t>Establish </a:t>
-            </a:r>
-            <a:r>
-              <a:rPr lang="en-US" sz="3000" dirty="0" smtClean="0">
-                <a:solidFill>
-                  <a:srgbClr val="FFFFFF"/>
-                </a:solidFill>
-              </a:rPr>
-              <a:t>Goals</a:t>
+              <a:t>Establish Goals</a:t>
             </a:r>
             <a:endParaRPr lang="en" sz="3000" dirty="0">
               <a:solidFill>
@@ -14123,15 +14036,7 @@
                   <a:srgbClr val="FFFFFF"/>
                 </a:solidFill>
               </a:rPr>
-              <a:t>What </a:t>
-            </a:r>
-            <a:r>
-              <a:rPr lang="en-US" sz="3000" dirty="0" smtClean="0">
-                <a:solidFill>
-                  <a:srgbClr val="FFFFFF"/>
-                </a:solidFill>
-              </a:rPr>
-              <a:t>We Do Now</a:t>
+              <a:t>What We Do Now</a:t>
             </a:r>
             <a:endParaRPr lang="en" sz="3000" dirty="0">
               <a:solidFill>
@@ -16195,23 +16100,7 @@
                   <a:srgbClr val="073763"/>
                 </a:solidFill>
               </a:rPr>
-              <a:t>R</a:t>
-            </a:r>
-            <a:r>
-              <a:rPr lang="en" sz="1400" dirty="0" smtClean="0">
-                <a:solidFill>
-                  <a:srgbClr val="073763"/>
-                </a:solidFill>
-              </a:rPr>
-              <a:t>s</a:t>
-            </a:r>
-            <a:r>
-              <a:rPr lang="en" sz="1400" dirty="0" smtClean="0">
-                <a:solidFill>
-                  <a:srgbClr val="073763"/>
-                </a:solidFill>
-              </a:rPr>
-              <a:t>pec</a:t>
+              <a:t>Rspec</a:t>
             </a:r>
             <a:endParaRPr lang="en-US" sz="1400" dirty="0" smtClean="0">
               <a:solidFill>

</xml_diff>